<commit_message>
AIS: Added decision diagram
</commit_message>
<xml_diff>
--- a/AIS/projekt/etap1/etap1.pptx
+++ b/AIS/projekt/etap1/etap1.pptx
@@ -5,24 +5,26 @@
     <p:sldMasterId id="2147483660" r:id="rId1"/>
   </p:sldMasterIdLst>
   <p:notesMasterIdLst>
-    <p:notesMasterId r:id="rId17"/>
+    <p:notesMasterId r:id="rId19"/>
   </p:notesMasterIdLst>
   <p:sldIdLst>
     <p:sldId id="256" r:id="rId2"/>
     <p:sldId id="257" r:id="rId3"/>
     <p:sldId id="260" r:id="rId4"/>
     <p:sldId id="259" r:id="rId5"/>
-    <p:sldId id="258" r:id="rId6"/>
-    <p:sldId id="261" r:id="rId7"/>
-    <p:sldId id="262" r:id="rId8"/>
-    <p:sldId id="264" r:id="rId9"/>
-    <p:sldId id="263" r:id="rId10"/>
-    <p:sldId id="265" r:id="rId11"/>
-    <p:sldId id="266" r:id="rId12"/>
-    <p:sldId id="267" r:id="rId13"/>
-    <p:sldId id="268" r:id="rId14"/>
-    <p:sldId id="269" r:id="rId15"/>
-    <p:sldId id="270" r:id="rId16"/>
+    <p:sldId id="272" r:id="rId6"/>
+    <p:sldId id="258" r:id="rId7"/>
+    <p:sldId id="261" r:id="rId8"/>
+    <p:sldId id="262" r:id="rId9"/>
+    <p:sldId id="264" r:id="rId10"/>
+    <p:sldId id="263" r:id="rId11"/>
+    <p:sldId id="265" r:id="rId12"/>
+    <p:sldId id="266" r:id="rId13"/>
+    <p:sldId id="267" r:id="rId14"/>
+    <p:sldId id="268" r:id="rId15"/>
+    <p:sldId id="271" r:id="rId16"/>
+    <p:sldId id="269" r:id="rId17"/>
+    <p:sldId id="270" r:id="rId18"/>
   </p:sldIdLst>
   <p:sldSz cx="9144000" cy="6858000" type="screen4x3"/>
   <p:notesSz cx="6858000" cy="9144000"/>
@@ -206,7 +208,7 @@
           <a:p>
             <a:fld id="{0E8CE136-6A4F-405F-994D-6EF40211894C}" type="datetimeFigureOut">
               <a:rPr lang="pl-PL" smtClean="0"/>
-              <a:t>2014-03-29</a:t>
+              <a:t>2014-04-06</a:t>
             </a:fld>
             <a:endParaRPr lang="pl-PL"/>
           </a:p>
@@ -668,7 +670,7 @@
           <a:p>
             <a:fld id="{A5A30E86-4703-4BE0-8746-EF785255E7FC}" type="datetime1">
               <a:rPr lang="pl-PL" smtClean="0"/>
-              <a:t>2014-03-29</a:t>
+              <a:t>2014-04-06</a:t>
             </a:fld>
             <a:endParaRPr lang="pl-PL"/>
           </a:p>
@@ -833,7 +835,7 @@
           <a:p>
             <a:fld id="{0B162551-AC8F-4D84-9AF6-6FAF0143D727}" type="datetime1">
               <a:rPr lang="pl-PL" smtClean="0"/>
-              <a:t>2014-03-29</a:t>
+              <a:t>2014-04-06</a:t>
             </a:fld>
             <a:endParaRPr lang="pl-PL"/>
           </a:p>
@@ -1008,7 +1010,7 @@
           <a:p>
             <a:fld id="{A69385A8-7667-4AED-B2E3-A07F02547DC6}" type="datetime1">
               <a:rPr lang="pl-PL" smtClean="0"/>
-              <a:t>2014-03-29</a:t>
+              <a:t>2014-04-06</a:t>
             </a:fld>
             <a:endParaRPr lang="pl-PL"/>
           </a:p>
@@ -1173,7 +1175,7 @@
           <a:p>
             <a:fld id="{1E85445B-7127-4045-9D90-2FA1820EC1C9}" type="datetime1">
               <a:rPr lang="pl-PL" smtClean="0"/>
-              <a:t>2014-03-29</a:t>
+              <a:t>2014-04-06</a:t>
             </a:fld>
             <a:endParaRPr lang="pl-PL"/>
           </a:p>
@@ -1414,7 +1416,7 @@
           <a:p>
             <a:fld id="{5BB94BA1-1549-48FB-A024-502A77743CD9}" type="datetime1">
               <a:rPr lang="pl-PL" smtClean="0"/>
-              <a:t>2014-03-29</a:t>
+              <a:t>2014-04-06</a:t>
             </a:fld>
             <a:endParaRPr lang="pl-PL"/>
           </a:p>
@@ -1697,7 +1699,7 @@
           <a:p>
             <a:fld id="{A4DE25BA-D850-434F-90F2-272DC173A689}" type="datetime1">
               <a:rPr lang="pl-PL" smtClean="0"/>
-              <a:t>2014-03-29</a:t>
+              <a:t>2014-04-06</a:t>
             </a:fld>
             <a:endParaRPr lang="pl-PL"/>
           </a:p>
@@ -2126,7 +2128,7 @@
           <a:p>
             <a:fld id="{DFD4E9DA-1B31-4E5A-9037-6FE74511B4D2}" type="datetime1">
               <a:rPr lang="pl-PL" smtClean="0"/>
-              <a:t>2014-03-29</a:t>
+              <a:t>2014-04-06</a:t>
             </a:fld>
             <a:endParaRPr lang="pl-PL"/>
           </a:p>
@@ -2239,7 +2241,7 @@
           <a:p>
             <a:fld id="{10C81AA5-8716-4F35-BD40-993A968698AF}" type="datetime1">
               <a:rPr lang="pl-PL" smtClean="0"/>
-              <a:t>2014-03-29</a:t>
+              <a:t>2014-04-06</a:t>
             </a:fld>
             <a:endParaRPr lang="pl-PL"/>
           </a:p>
@@ -2329,7 +2331,7 @@
           <a:p>
             <a:fld id="{4F6B7963-0B35-499A-80C1-9BFD1AD47ABF}" type="datetime1">
               <a:rPr lang="pl-PL" smtClean="0"/>
-              <a:t>2014-03-29</a:t>
+              <a:t>2014-04-06</a:t>
             </a:fld>
             <a:endParaRPr lang="pl-PL"/>
           </a:p>
@@ -2518,7 +2520,7 @@
           <a:p>
             <a:fld id="{04C7B7FD-273C-44A8-836C-18633B9C26B3}" type="datetime1">
               <a:rPr lang="pl-PL" smtClean="0"/>
-              <a:t>2014-03-29</a:t>
+              <a:t>2014-04-06</a:t>
             </a:fld>
             <a:endParaRPr lang="pl-PL"/>
           </a:p>
@@ -2836,7 +2838,7 @@
           <a:p>
             <a:fld id="{44C78BE8-61CD-486F-8091-DC8EEF611B81}" type="datetime1">
               <a:rPr lang="pl-PL" smtClean="0"/>
-              <a:t>2014-03-29</a:t>
+              <a:t>2014-04-06</a:t>
             </a:fld>
             <a:endParaRPr lang="pl-PL"/>
           </a:p>
@@ -3215,7 +3217,7 @@
           <a:p>
             <a:fld id="{F91E9760-4846-43BB-B263-7C81473181BF}" type="datetime1">
               <a:rPr lang="pl-PL" smtClean="0"/>
-              <a:t>2014-03-29</a:t>
+              <a:t>2014-04-06</a:t>
             </a:fld>
             <a:endParaRPr lang="pl-PL"/>
           </a:p>
@@ -3753,12 +3755,9 @@
             </a:r>
             <a:r>
               <a:rPr lang="pl-PL" dirty="0" smtClean="0"/>
-              <a:t>Physical </a:t>
-            </a:r>
-            <a:r>
-              <a:rPr lang="pl-PL" dirty="0"/>
-              <a:t>View</a:t>
-            </a:r>
+              <a:t>Process View</a:t>
+            </a:r>
+            <a:endParaRPr lang="pl-PL" dirty="0"/>
           </a:p>
         </p:txBody>
       </p:sp>
@@ -3780,6 +3779,125 @@
             <a:fld id="{1F7F3A02-1D12-4D1D-B3D0-BE69B2FD8F86}" type="slidenum">
               <a:rPr lang="pl-PL" smtClean="0"/>
               <a:t>10</a:t>
+            </a:fld>
+            <a:endParaRPr lang="pl-PL"/>
+          </a:p>
+        </p:txBody>
+      </p:sp>
+      <p:pic>
+        <p:nvPicPr>
+          <p:cNvPr id="8" name="Content Placeholder 7"/>
+          <p:cNvPicPr>
+            <a:picLocks noGrp="1" noChangeAspect="1"/>
+          </p:cNvPicPr>
+          <p:nvPr>
+            <p:ph idx="1"/>
+          </p:nvPr>
+        </p:nvPicPr>
+        <p:blipFill>
+          <a:blip r:embed="rId2">
+            <a:extLst>
+              <a:ext uri="{28A0092B-C50C-407E-A947-70E740481C1C}">
+                <a14:useLocalDpi xmlns:a14="http://schemas.microsoft.com/office/drawing/2010/main" val="0"/>
+              </a:ext>
+            </a:extLst>
+          </a:blip>
+          <a:stretch>
+            <a:fillRect/>
+          </a:stretch>
+        </p:blipFill>
+        <p:spPr>
+          <a:xfrm>
+            <a:off x="107504" y="2132856"/>
+            <a:ext cx="8264025" cy="3198030"/>
+          </a:xfrm>
+        </p:spPr>
+      </p:pic>
+    </p:spTree>
+    <p:extLst>
+      <p:ext uri="{BB962C8B-B14F-4D97-AF65-F5344CB8AC3E}">
+        <p14:creationId xmlns:p14="http://schemas.microsoft.com/office/powerpoint/2010/main" val="740073496"/>
+      </p:ext>
+    </p:extLst>
+  </p:cSld>
+  <p:clrMapOvr>
+    <a:masterClrMapping/>
+  </p:clrMapOvr>
+  <p:timing>
+    <p:tnLst>
+      <p:par>
+        <p:cTn id="1" dur="indefinite" restart="never" nodeType="tmRoot"/>
+      </p:par>
+    </p:tnLst>
+  </p:timing>
+</p:sld>
+</file>
+
+<file path=ppt/slides/slide11.xml><?xml version="1.0" encoding="utf-8"?>
+<p:sld xmlns:a="http://schemas.openxmlformats.org/drawingml/2006/main" xmlns:r="http://schemas.openxmlformats.org/officeDocument/2006/relationships" xmlns:p="http://schemas.openxmlformats.org/presentationml/2006/main">
+  <p:cSld>
+    <p:spTree>
+      <p:nvGrpSpPr>
+        <p:cNvPr id="1" name=""/>
+        <p:cNvGrpSpPr/>
+        <p:nvPr/>
+      </p:nvGrpSpPr>
+      <p:grpSpPr>
+        <a:xfrm>
+          <a:off x="0" y="0"/>
+          <a:ext cx="0" cy="0"/>
+          <a:chOff x="0" y="0"/>
+          <a:chExt cx="0" cy="0"/>
+        </a:xfrm>
+      </p:grpSpPr>
+      <p:sp>
+        <p:nvSpPr>
+          <p:cNvPr id="2" name="Title 1"/>
+          <p:cNvSpPr>
+            <a:spLocks noGrp="1"/>
+          </p:cNvSpPr>
+          <p:nvPr>
+            <p:ph type="title"/>
+          </p:nvPr>
+        </p:nvSpPr>
+        <p:spPr/>
+        <p:txBody>
+          <a:bodyPr/>
+          <a:lstStyle/>
+          <a:p>
+            <a:r>
+              <a:rPr lang="pl-PL" dirty="0"/>
+              <a:t>4+1 Views: </a:t>
+            </a:r>
+            <a:r>
+              <a:rPr lang="pl-PL" dirty="0" smtClean="0"/>
+              <a:t>Physical </a:t>
+            </a:r>
+            <a:r>
+              <a:rPr lang="pl-PL" dirty="0"/>
+              <a:t>View</a:t>
+            </a:r>
+          </a:p>
+        </p:txBody>
+      </p:sp>
+      <p:sp>
+        <p:nvSpPr>
+          <p:cNvPr id="4" name="Slide Number Placeholder 3"/>
+          <p:cNvSpPr>
+            <a:spLocks noGrp="1"/>
+          </p:cNvSpPr>
+          <p:nvPr>
+            <p:ph type="sldNum" sz="quarter" idx="12"/>
+          </p:nvPr>
+        </p:nvSpPr>
+        <p:spPr/>
+        <p:txBody>
+          <a:bodyPr/>
+          <a:lstStyle/>
+          <a:p>
+            <a:fld id="{1F7F3A02-1D12-4D1D-B3D0-BE69B2FD8F86}" type="slidenum">
+              <a:rPr lang="pl-PL" smtClean="0"/>
+              <a:t>11</a:t>
             </a:fld>
             <a:endParaRPr lang="pl-PL"/>
           </a:p>
@@ -3835,162 +3953,6 @@
 </p:sld>
 </file>
 
-<file path=ppt/slides/slide11.xml><?xml version="1.0" encoding="utf-8"?>
-<p:sld xmlns:a="http://schemas.openxmlformats.org/drawingml/2006/main" xmlns:r="http://schemas.openxmlformats.org/officeDocument/2006/relationships" xmlns:p="http://schemas.openxmlformats.org/presentationml/2006/main">
-  <p:cSld>
-    <p:spTree>
-      <p:nvGrpSpPr>
-        <p:cNvPr id="1" name=""/>
-        <p:cNvGrpSpPr/>
-        <p:nvPr/>
-      </p:nvGrpSpPr>
-      <p:grpSpPr>
-        <a:xfrm>
-          <a:off x="0" y="0"/>
-          <a:ext cx="0" cy="0"/>
-          <a:chOff x="0" y="0"/>
-          <a:chExt cx="0" cy="0"/>
-        </a:xfrm>
-      </p:grpSpPr>
-      <p:sp>
-        <p:nvSpPr>
-          <p:cNvPr id="2" name="Title 1"/>
-          <p:cNvSpPr>
-            <a:spLocks noGrp="1"/>
-          </p:cNvSpPr>
-          <p:nvPr>
-            <p:ph type="title"/>
-          </p:nvPr>
-        </p:nvSpPr>
-        <p:spPr/>
-        <p:txBody>
-          <a:bodyPr/>
-          <a:lstStyle/>
-          <a:p>
-            <a:r>
-              <a:rPr lang="pl-PL" dirty="0" smtClean="0"/>
-              <a:t>Wzorce architektoniczne</a:t>
-            </a:r>
-            <a:endParaRPr lang="pl-PL" dirty="0"/>
-          </a:p>
-        </p:txBody>
-      </p:sp>
-      <p:sp>
-        <p:nvSpPr>
-          <p:cNvPr id="3" name="Content Placeholder 2"/>
-          <p:cNvSpPr>
-            <a:spLocks noGrp="1"/>
-          </p:cNvSpPr>
-          <p:nvPr>
-            <p:ph idx="1"/>
-          </p:nvPr>
-        </p:nvSpPr>
-        <p:spPr/>
-        <p:txBody>
-          <a:bodyPr>
-            <a:normAutofit lnSpcReduction="10000"/>
-          </a:bodyPr>
-          <a:lstStyle/>
-          <a:p>
-            <a:r>
-              <a:rPr lang="pl-PL" dirty="0" smtClean="0"/>
-              <a:t>Dwóch brokerów w procesie zlecania misji:</a:t>
-            </a:r>
-          </a:p>
-          <a:p>
-            <a:pPr lvl="1"/>
-            <a:r>
-              <a:rPr lang="pl-PL" dirty="0" smtClean="0"/>
-              <a:t>Pierwszy broker: operator </a:t>
-            </a:r>
-          </a:p>
-          <a:p>
-            <a:pPr lvl="1"/>
-            <a:r>
-              <a:rPr lang="pl-PL" dirty="0" smtClean="0"/>
-              <a:t>Drugi broker: stacja kontroli</a:t>
-            </a:r>
-          </a:p>
-          <a:p>
-            <a:r>
-              <a:rPr lang="pl-PL" dirty="0" smtClean="0"/>
-              <a:t>Architektura publikuj-i-zarejestruj-się – użytkownik publikuje misję samolotu i rejestruje się jako odbiorca związanych z nią danych</a:t>
-            </a:r>
-          </a:p>
-          <a:p>
-            <a:r>
-              <a:rPr lang="pl-PL" dirty="0" smtClean="0"/>
-              <a:t>Serwer centralny pełni rolę magistrali</a:t>
-            </a:r>
-          </a:p>
-          <a:p>
-            <a:r>
-              <a:rPr lang="pl-PL" dirty="0" smtClean="0"/>
-              <a:t>Implementacja komunikacji moduł kliencki – moduł operatora/samolot realizuje architekturę klient – serwer</a:t>
-            </a:r>
-          </a:p>
-          <a:p>
-            <a:r>
-              <a:rPr lang="pl-PL" dirty="0" smtClean="0"/>
-              <a:t>Realizacja wzorca MVC</a:t>
-            </a:r>
-          </a:p>
-          <a:p>
-            <a:pPr lvl="1"/>
-            <a:r>
-              <a:rPr lang="pl-PL" dirty="0" smtClean="0"/>
-              <a:t>Modelem jest lokalna baza danych danych stacji</a:t>
-            </a:r>
-          </a:p>
-          <a:p>
-            <a:pPr lvl="1"/>
-            <a:r>
-              <a:rPr lang="pl-PL" dirty="0"/>
-              <a:t>Stacja kontrola udostępnia użytkownikowi widok danych misji – jest zatem </a:t>
-            </a:r>
-            <a:r>
-              <a:rPr lang="pl-PL" dirty="0" smtClean="0"/>
-              <a:t>kontrolerem</a:t>
-            </a:r>
-          </a:p>
-        </p:txBody>
-      </p:sp>
-      <p:sp>
-        <p:nvSpPr>
-          <p:cNvPr id="4" name="Slide Number Placeholder 3"/>
-          <p:cNvSpPr>
-            <a:spLocks noGrp="1"/>
-          </p:cNvSpPr>
-          <p:nvPr>
-            <p:ph type="sldNum" sz="quarter" idx="12"/>
-          </p:nvPr>
-        </p:nvSpPr>
-        <p:spPr/>
-        <p:txBody>
-          <a:bodyPr/>
-          <a:lstStyle/>
-          <a:p>
-            <a:fld id="{1F7F3A02-1D12-4D1D-B3D0-BE69B2FD8F86}" type="slidenum">
-              <a:rPr lang="pl-PL" smtClean="0"/>
-              <a:t>11</a:t>
-            </a:fld>
-            <a:endParaRPr lang="pl-PL"/>
-          </a:p>
-        </p:txBody>
-      </p:sp>
-    </p:spTree>
-    <p:extLst>
-      <p:ext uri="{BB962C8B-B14F-4D97-AF65-F5344CB8AC3E}">
-        <p14:creationId xmlns:p14="http://schemas.microsoft.com/office/powerpoint/2010/main" val="707875789"/>
-      </p:ext>
-    </p:extLst>
-  </p:cSld>
-  <p:clrMapOvr>
-    <a:masterClrMapping/>
-  </p:clrMapOvr>
-</p:sld>
-</file>
-
 <file path=ppt/slides/slide12.xml><?xml version="1.0" encoding="utf-8"?>
 <p:sld xmlns:a="http://schemas.openxmlformats.org/drawingml/2006/main" xmlns:r="http://schemas.openxmlformats.org/officeDocument/2006/relationships" xmlns:p="http://schemas.openxmlformats.org/presentationml/2006/main">
   <p:cSld>
@@ -4025,7 +3987,7 @@
           <a:p>
             <a:r>
               <a:rPr lang="pl-PL" dirty="0" smtClean="0"/>
-              <a:t>Taktyki dostępności (I)</a:t>
+              <a:t>Wzorce architektoniczne</a:t>
             </a:r>
             <a:endParaRPr lang="pl-PL" dirty="0"/>
           </a:p>
@@ -4041,96 +4003,72 @@
             <p:ph idx="1"/>
           </p:nvPr>
         </p:nvSpPr>
-        <p:spPr>
-          <a:xfrm>
-            <a:off x="467544" y="1412776"/>
-            <a:ext cx="7620000" cy="5069160"/>
-          </a:xfrm>
-        </p:spPr>
-        <p:txBody>
-          <a:bodyPr/>
-          <a:lstStyle/>
-          <a:p>
-            <a:r>
-              <a:rPr lang="pl-PL" dirty="0" smtClean="0"/>
-              <a:t>Ping/echo:</a:t>
+        <p:spPr/>
+        <p:txBody>
+          <a:bodyPr>
+            <a:normAutofit lnSpcReduction="10000"/>
+          </a:bodyPr>
+          <a:lstStyle/>
+          <a:p>
+            <a:r>
+              <a:rPr lang="pl-PL" dirty="0" smtClean="0"/>
+              <a:t>Dwóch brokerów w procesie zlecania misji:</a:t>
             </a:r>
           </a:p>
           <a:p>
             <a:pPr lvl="1"/>
             <a:r>
               <a:rPr lang="pl-PL" dirty="0" smtClean="0"/>
-              <a:t>Odpytywanie samolotu przez stację kontrolną co minutę. </a:t>
+              <a:t>Pierwszy broker: operator </a:t>
             </a:r>
           </a:p>
           <a:p>
             <a:pPr lvl="1"/>
             <a:r>
               <a:rPr lang="pl-PL" dirty="0" smtClean="0"/>
-              <a:t>W przypadku braku odpowiedzi po 30 sekundach następuje powtórne odpytanie. </a:t>
+              <a:t>Drugi broker: stacja kontroli</a:t>
+            </a:r>
+          </a:p>
+          <a:p>
+            <a:r>
+              <a:rPr lang="pl-PL" dirty="0" smtClean="0"/>
+              <a:t>Architektura publikuj-i-zarejestruj-się – użytkownik publikuje misję samolotu i rejestruje się jako odbiorca związanych z nią danych</a:t>
+            </a:r>
+          </a:p>
+          <a:p>
+            <a:r>
+              <a:rPr lang="pl-PL" dirty="0" smtClean="0"/>
+              <a:t>Serwer centralny pełni rolę magistrali</a:t>
+            </a:r>
+          </a:p>
+          <a:p>
+            <a:r>
+              <a:rPr lang="pl-PL" dirty="0" smtClean="0"/>
+              <a:t>Implementacja komunikacji moduł kliencki – moduł operatora/samolot realizuje architekturę klient – serwer</a:t>
+            </a:r>
+          </a:p>
+          <a:p>
+            <a:r>
+              <a:rPr lang="pl-PL" dirty="0" smtClean="0"/>
+              <a:t>Realizacja wzorca MVC</a:t>
             </a:r>
           </a:p>
           <a:p>
             <a:pPr lvl="1"/>
             <a:r>
               <a:rPr lang="pl-PL" dirty="0" smtClean="0"/>
-              <a:t>Kolejny brak odpowiedzi skutkuje podniesieniem alarmu.</a:t>
-            </a:r>
-          </a:p>
-          <a:p>
-            <a:r>
-              <a:rPr lang="pl-PL" dirty="0" smtClean="0"/>
-              <a:t>Self-test: </a:t>
+              <a:t>Modelem jest lokalna baza danych danych stacji</a:t>
             </a:r>
           </a:p>
           <a:p>
             <a:pPr lvl="1"/>
             <a:r>
-              <a:rPr lang="pl-PL" dirty="0" smtClean="0"/>
-              <a:t>Odpytywanie samolotu przez stację kontrolną co pół godziny.</a:t>
-            </a:r>
-          </a:p>
-          <a:p>
-            <a:pPr lvl="1"/>
-            <a:r>
-              <a:rPr lang="pl-PL" dirty="0" smtClean="0"/>
-              <a:t>Stacja kontrolna odpytuje samolot o bieżącą pozycję i stan urządzeń pokładowych.</a:t>
-            </a:r>
-            <a:endParaRPr lang="pl-PL" dirty="0"/>
-          </a:p>
-          <a:p>
-            <a:pPr lvl="1"/>
-            <a:r>
-              <a:rPr lang="pl-PL" dirty="0" smtClean="0"/>
-              <a:t>Alarm podnoszony jest w przypadku:</a:t>
-            </a:r>
-          </a:p>
-          <a:p>
-            <a:pPr lvl="2"/>
-            <a:r>
-              <a:rPr lang="pl-PL" dirty="0" smtClean="0"/>
-              <a:t>Braku odpowiedzi.</a:t>
-            </a:r>
-          </a:p>
-          <a:p>
-            <a:pPr lvl="2"/>
-            <a:r>
-              <a:rPr lang="pl-PL" dirty="0" smtClean="0"/>
-              <a:t>Znaczącej zmiany pozycji samolotu (prawdopodobna awaria GPS).</a:t>
-            </a:r>
-          </a:p>
-          <a:p>
-            <a:pPr lvl="2"/>
-            <a:r>
-              <a:rPr lang="pl-PL" dirty="0" smtClean="0"/>
-              <a:t>Niezgodności pozycji z założeniami misji.</a:t>
-            </a:r>
-          </a:p>
-          <a:p>
-            <a:pPr lvl="2"/>
-            <a:r>
-              <a:rPr lang="pl-PL" dirty="0" smtClean="0"/>
-              <a:t>Komunikatu o błędnym działaniu urządzeń pokładowych.</a:t>
+              <a:rPr lang="pl-PL" dirty="0"/>
+              <a:t>Stacja kontrola udostępnia użytkownikowi widok danych misji – jest zatem </a:t>
+            </a:r>
+            <a:r>
+              <a:rPr lang="pl-PL" dirty="0" smtClean="0"/>
+              <a:t>kontrolerem</a:t>
             </a:r>
           </a:p>
         </p:txBody>
@@ -4161,7 +4099,7 @@
     </p:spTree>
     <p:extLst>
       <p:ext uri="{BB962C8B-B14F-4D97-AF65-F5344CB8AC3E}">
-        <p14:creationId xmlns:p14="http://schemas.microsoft.com/office/powerpoint/2010/main" val="3083557138"/>
+        <p14:creationId xmlns:p14="http://schemas.microsoft.com/office/powerpoint/2010/main" val="707875789"/>
       </p:ext>
     </p:extLst>
   </p:cSld>
@@ -4205,7 +4143,7 @@
           <a:p>
             <a:r>
               <a:rPr lang="pl-PL" dirty="0" smtClean="0"/>
-              <a:t>Taktyki dostępności (II)</a:t>
+              <a:t>Taktyki dostępności (I)</a:t>
             </a:r>
             <a:endParaRPr lang="pl-PL" dirty="0"/>
           </a:p>
@@ -4221,36 +4159,140 @@
             <p:ph idx="1"/>
           </p:nvPr>
         </p:nvSpPr>
-        <p:spPr/>
-        <p:txBody>
-          <a:bodyPr/>
-          <a:lstStyle/>
-          <a:p>
-            <a:r>
-              <a:rPr lang="pl-PL" dirty="0" smtClean="0"/>
-              <a:t>Redundancja serwerów aplikacji webowej celem wyeliminowania sytuacji, w której potencjalny klient nie może zgłosić misji.</a:t>
-            </a:r>
-          </a:p>
-          <a:p>
-            <a:r>
-              <a:rPr lang="pl-PL" dirty="0" smtClean="0"/>
-              <a:t>Codzienne kopie zapasowe wszystkich baz danych przechowywane przez miesiąc czasu.</a:t>
-            </a:r>
-          </a:p>
-          <a:p>
-            <a:r>
-              <a:rPr lang="pl-PL" dirty="0" smtClean="0"/>
-              <a:t>Redundancja danych w modułach operatora i stacji kontrolnej – przykładowo wykorzystanie macierzy RAID.</a:t>
-            </a:r>
-          </a:p>
-          <a:p>
-            <a:r>
-              <a:rPr lang="pl-PL" dirty="0" smtClean="0"/>
-              <a:t>Zapobieganie awariom: jeśli podniesiony zostanie alarm dla samolotu, samolot ten przestaje być dostępny dla klientów (removal from service).</a:t>
+        <p:spPr>
+          <a:xfrm>
+            <a:off x="467544" y="1412776"/>
+            <a:ext cx="7620000" cy="5069160"/>
+          </a:xfrm>
+        </p:spPr>
+        <p:txBody>
+          <a:bodyPr/>
+          <a:lstStyle/>
+          <a:p>
+            <a:r>
+              <a:rPr lang="pl-PL" dirty="0" smtClean="0"/>
+              <a:t>Ping/echo:</a:t>
+            </a:r>
+          </a:p>
+          <a:p>
+            <a:pPr lvl="1"/>
+            <a:r>
+              <a:rPr lang="pl-PL" dirty="0" smtClean="0"/>
+              <a:t>Odpytywanie samolotu przez stację kontrolną co </a:t>
+            </a:r>
+            <a:r>
+              <a:rPr lang="pl-PL" dirty="0" smtClean="0"/>
+              <a:t>minutę</a:t>
+            </a:r>
+            <a:endParaRPr lang="pl-PL" dirty="0" smtClean="0"/>
+          </a:p>
+          <a:p>
+            <a:pPr lvl="1"/>
+            <a:r>
+              <a:rPr lang="pl-PL" dirty="0" smtClean="0"/>
+              <a:t>W przypadku braku odpowiedzi po 30 sekundach następuje powtórne </a:t>
+            </a:r>
+            <a:r>
+              <a:rPr lang="pl-PL" dirty="0" smtClean="0"/>
+              <a:t>odpytanie</a:t>
+            </a:r>
+            <a:endParaRPr lang="pl-PL" dirty="0" smtClean="0"/>
+          </a:p>
+          <a:p>
+            <a:pPr lvl="1"/>
+            <a:r>
+              <a:rPr lang="pl-PL" dirty="0" smtClean="0"/>
+              <a:t>Kolejny brak odpowiedzi skutkuje podniesieniem </a:t>
+            </a:r>
+            <a:r>
+              <a:rPr lang="pl-PL" dirty="0" smtClean="0"/>
+              <a:t>alarmu</a:t>
+            </a:r>
+            <a:endParaRPr lang="pl-PL" dirty="0" smtClean="0"/>
+          </a:p>
+          <a:p>
+            <a:r>
+              <a:rPr lang="pl-PL" dirty="0" smtClean="0"/>
+              <a:t>Self-test: </a:t>
+            </a:r>
+          </a:p>
+          <a:p>
+            <a:pPr lvl="1"/>
+            <a:r>
+              <a:rPr lang="pl-PL" dirty="0" smtClean="0"/>
+              <a:t>Odpytywanie samolotu przez stację kontrolną co pół </a:t>
+            </a:r>
+            <a:r>
+              <a:rPr lang="pl-PL" dirty="0" smtClean="0"/>
+              <a:t>godziny</a:t>
+            </a:r>
+            <a:endParaRPr lang="pl-PL" dirty="0" smtClean="0"/>
+          </a:p>
+          <a:p>
+            <a:pPr lvl="1"/>
+            <a:r>
+              <a:rPr lang="pl-PL" dirty="0" smtClean="0"/>
+              <a:t>Stacja kontrolna odpytuje samolot o bieżącą pozycję i stan urządzeń </a:t>
+            </a:r>
+            <a:r>
+              <a:rPr lang="pl-PL" dirty="0" smtClean="0"/>
+              <a:t>pokładowych</a:t>
             </a:r>
             <a:endParaRPr lang="pl-PL" dirty="0"/>
           </a:p>
           <a:p>
+            <a:pPr lvl="1"/>
+            <a:r>
+              <a:rPr lang="pl-PL" dirty="0" smtClean="0"/>
+              <a:t>Alarm podnoszony jest w przypadku:</a:t>
+            </a:r>
+          </a:p>
+          <a:p>
+            <a:pPr lvl="2"/>
+            <a:r>
+              <a:rPr lang="pl-PL" dirty="0" smtClean="0"/>
+              <a:t>Braku </a:t>
+            </a:r>
+            <a:r>
+              <a:rPr lang="pl-PL" dirty="0" smtClean="0"/>
+              <a:t>odpowiedzi</a:t>
+            </a:r>
+            <a:endParaRPr lang="pl-PL" dirty="0" smtClean="0"/>
+          </a:p>
+          <a:p>
+            <a:pPr lvl="2"/>
+            <a:r>
+              <a:rPr lang="pl-PL" dirty="0" smtClean="0"/>
+              <a:t>Znaczącej zmiany pozycji samolotu (prawdopodobna awaria GPS</a:t>
+            </a:r>
+            <a:r>
+              <a:rPr lang="pl-PL" dirty="0" smtClean="0"/>
+              <a:t>)</a:t>
+            </a:r>
+            <a:endParaRPr lang="pl-PL" dirty="0" smtClean="0"/>
+          </a:p>
+          <a:p>
+            <a:pPr lvl="2"/>
+            <a:r>
+              <a:rPr lang="pl-PL" dirty="0" smtClean="0"/>
+              <a:t>Niezgodności pozycji z założeniami </a:t>
+            </a:r>
+            <a:r>
+              <a:rPr lang="pl-PL" dirty="0" smtClean="0"/>
+              <a:t>misji</a:t>
+            </a:r>
+            <a:endParaRPr lang="pl-PL" dirty="0" smtClean="0"/>
+          </a:p>
+          <a:p>
+            <a:pPr lvl="2"/>
+            <a:r>
+              <a:rPr lang="pl-PL" dirty="0" smtClean="0"/>
+              <a:t>Komunikatu o błędnym działaniu urządzeń </a:t>
+            </a:r>
+            <a:r>
+              <a:rPr lang="pl-PL" dirty="0" smtClean="0"/>
+              <a:t>pokładowych</a:t>
+            </a:r>
             <a:endParaRPr lang="pl-PL" dirty="0" smtClean="0"/>
           </a:p>
         </p:txBody>
@@ -4281,7 +4323,7 @@
     </p:spTree>
     <p:extLst>
       <p:ext uri="{BB962C8B-B14F-4D97-AF65-F5344CB8AC3E}">
-        <p14:creationId xmlns:p14="http://schemas.microsoft.com/office/powerpoint/2010/main" val="377667798"/>
+        <p14:creationId xmlns:p14="http://schemas.microsoft.com/office/powerpoint/2010/main" val="3083557138"/>
       </p:ext>
     </p:extLst>
   </p:cSld>
@@ -4325,7 +4367,7 @@
           <a:p>
             <a:r>
               <a:rPr lang="pl-PL" dirty="0" smtClean="0"/>
-              <a:t>Inne taktyki</a:t>
+              <a:t>Taktyki dostępności (II)</a:t>
             </a:r>
             <a:endParaRPr lang="pl-PL" dirty="0"/>
           </a:p>
@@ -4341,105 +4383,56 @@
             <p:ph idx="1"/>
           </p:nvPr>
         </p:nvSpPr>
-        <p:spPr>
-          <a:xfrm>
-            <a:off x="457200" y="1340768"/>
-            <a:ext cx="7620000" cy="5400600"/>
-          </a:xfrm>
-        </p:spPr>
-        <p:txBody>
-          <a:bodyPr>
-            <a:normAutofit lnSpcReduction="10000"/>
-          </a:bodyPr>
-          <a:lstStyle/>
-          <a:p>
-            <a:r>
-              <a:rPr lang="pl-PL" dirty="0" smtClean="0"/>
-              <a:t>Interoperacyjność:</a:t>
-            </a:r>
-          </a:p>
-          <a:p>
-            <a:pPr lvl="1"/>
-            <a:r>
-              <a:rPr lang="pl-PL" dirty="0" smtClean="0"/>
-              <a:t>Service discovery - samoloty samodzielnie zgłaszają się do stacji kontroli;</a:t>
-            </a:r>
-          </a:p>
-          <a:p>
-            <a:r>
-              <a:rPr lang="pl-PL" dirty="0" smtClean="0"/>
-              <a:t>Modyfikowalność:</a:t>
-            </a:r>
-          </a:p>
-          <a:p>
-            <a:pPr lvl="1"/>
-            <a:r>
-              <a:rPr lang="pl-PL" dirty="0" smtClean="0"/>
-              <a:t>Coupling reduction: </a:t>
-            </a:r>
-          </a:p>
-          <a:p>
-            <a:pPr lvl="2"/>
-            <a:r>
-              <a:rPr lang="pl-PL" dirty="0" smtClean="0"/>
-              <a:t>serwer stacji nie musi wiedzieć ilu jest klientów systemu,</a:t>
-            </a:r>
-          </a:p>
-          <a:p>
-            <a:pPr lvl="2"/>
-            <a:r>
-              <a:rPr lang="pl-PL" dirty="0"/>
-              <a:t>s</a:t>
-            </a:r>
-            <a:r>
-              <a:rPr lang="pl-PL" dirty="0" smtClean="0"/>
-              <a:t>amolot nie musi wiedzieć o istnieniu klientów i serwera centralnego</a:t>
-            </a:r>
-          </a:p>
-          <a:p>
-            <a:pPr lvl="1"/>
-            <a:r>
-              <a:rPr lang="pl-PL" dirty="0" smtClean="0"/>
-              <a:t>Komunikacja przez pośrednika:</a:t>
-            </a:r>
-          </a:p>
-          <a:p>
-            <a:pPr lvl="2"/>
-            <a:r>
-              <a:rPr lang="pl-PL" dirty="0"/>
-              <a:t>w</a:t>
-            </a:r>
-            <a:r>
-              <a:rPr lang="pl-PL" dirty="0" smtClean="0"/>
-              <a:t>szelka komunikacja z samolotem następuje za pośrednictwem stacji kontrolnej;</a:t>
-            </a:r>
-          </a:p>
-          <a:p>
-            <a:r>
-              <a:rPr lang="pl-PL" dirty="0" smtClean="0"/>
-              <a:t>Wydajność:</a:t>
-            </a:r>
-          </a:p>
-          <a:p>
-            <a:pPr lvl="1"/>
-            <a:r>
-              <a:rPr lang="pl-PL" dirty="0" smtClean="0"/>
-              <a:t>Ograniczenie narzutów: samolot komunikuje się jedynie ze stacją kontrolną, co pozwala osiągnąć wydajne sterowanie jego lotem</a:t>
-            </a:r>
-          </a:p>
-          <a:p>
-            <a:pPr lvl="1"/>
-            <a:r>
-              <a:rPr lang="pl-PL" dirty="0" smtClean="0"/>
-              <a:t>Zrównoleglenie obliczeń: zgłoszone misje mogą być rozpatrywane niezależnie</a:t>
-            </a:r>
-          </a:p>
-          <a:p>
-            <a:pPr lvl="1"/>
-            <a:r>
-              <a:rPr lang="pl-PL" dirty="0" smtClean="0"/>
-              <a:t>Szeregowanie zadań: stacja kontrolna może wydajnie szeregować i przydzielać zlecone misje</a:t>
-            </a:r>
+        <p:spPr/>
+        <p:txBody>
+          <a:bodyPr/>
+          <a:lstStyle/>
+          <a:p>
+            <a:r>
+              <a:rPr lang="pl-PL" dirty="0" smtClean="0"/>
+              <a:t>Redundancja serwerów aplikacji webowej celem wyeliminowania sytuacji, w której potencjalny klient nie może zgłosić </a:t>
+            </a:r>
+            <a:r>
+              <a:rPr lang="pl-PL" dirty="0" smtClean="0"/>
+              <a:t>misji</a:t>
+            </a:r>
+            <a:endParaRPr lang="pl-PL" dirty="0" smtClean="0"/>
+          </a:p>
+          <a:p>
+            <a:r>
+              <a:rPr lang="pl-PL" dirty="0" smtClean="0"/>
+              <a:t>Codzienne kopie zapasowe wszystkich baz danych przechowywane przez miesiąc </a:t>
+            </a:r>
+            <a:r>
+              <a:rPr lang="pl-PL" dirty="0" smtClean="0"/>
+              <a:t>czasu</a:t>
+            </a:r>
+            <a:endParaRPr lang="pl-PL" dirty="0" smtClean="0"/>
+          </a:p>
+          <a:p>
+            <a:r>
+              <a:rPr lang="pl-PL" dirty="0" smtClean="0"/>
+              <a:t>Redundancja danych w modułach operatora i stacji kontrolnej – przykładowo wykorzystanie macierzy </a:t>
+            </a:r>
+            <a:r>
+              <a:rPr lang="pl-PL" dirty="0" smtClean="0"/>
+              <a:t>RAID</a:t>
+            </a:r>
+            <a:endParaRPr lang="pl-PL" dirty="0" smtClean="0"/>
+          </a:p>
+          <a:p>
+            <a:r>
+              <a:rPr lang="pl-PL" dirty="0" smtClean="0"/>
+              <a:t>Zapobieganie awariom: jeśli podniesiony zostanie alarm dla samolotu, samolot ten przestaje być dostępny dla klientów (removal from service</a:t>
+            </a:r>
+            <a:r>
+              <a:rPr lang="pl-PL" dirty="0" smtClean="0"/>
+              <a:t>)</a:t>
+            </a:r>
+            <a:endParaRPr lang="pl-PL" dirty="0"/>
+          </a:p>
+          <a:p>
+            <a:endParaRPr lang="pl-PL" dirty="0" smtClean="0"/>
           </a:p>
         </p:txBody>
       </p:sp>
@@ -4469,7 +4462,7 @@
     </p:spTree>
     <p:extLst>
       <p:ext uri="{BB962C8B-B14F-4D97-AF65-F5344CB8AC3E}">
-        <p14:creationId xmlns:p14="http://schemas.microsoft.com/office/powerpoint/2010/main" val="2757322131"/>
+        <p14:creationId xmlns:p14="http://schemas.microsoft.com/office/powerpoint/2010/main" val="377667798"/>
       </p:ext>
     </p:extLst>
   </p:cSld>
@@ -4513,7 +4506,11 @@
           <a:p>
             <a:r>
               <a:rPr lang="pl-PL" dirty="0" smtClean="0"/>
-              <a:t>Decyzcje architektoniczne</a:t>
+              <a:t>Taktyki </a:t>
+            </a:r>
+            <a:r>
+              <a:rPr lang="pl-PL" dirty="0" smtClean="0"/>
+              <a:t>wydajności</a:t>
             </a:r>
             <a:endParaRPr lang="pl-PL" dirty="0"/>
           </a:p>
@@ -4536,7 +4533,27 @@
           <a:p>
             <a:r>
               <a:rPr lang="pl-PL" dirty="0" smtClean="0"/>
-              <a:t>Stacja kontroli l</a:t>
+              <a:t>Ograniczenie </a:t>
+            </a:r>
+            <a:r>
+              <a:rPr lang="pl-PL" dirty="0"/>
+              <a:t>narzutów: samolot komunikuje się jedynie ze stacją kontrolną, co pozwala osiągnąć wydajne sterowanie jego lotem</a:t>
+            </a:r>
+          </a:p>
+          <a:p>
+            <a:r>
+              <a:rPr lang="pl-PL" dirty="0"/>
+              <a:t>Zrównoleglenie obliczeń: zgłoszone misje mogą być rozpatrywane niezależnie</a:t>
+            </a:r>
+          </a:p>
+          <a:p>
+            <a:r>
+              <a:rPr lang="pl-PL" dirty="0"/>
+              <a:t>Szeregowanie zadań: stacja kontrolna może wydajnie szeregować i przydzielać zlecone </a:t>
+            </a:r>
+            <a:r>
+              <a:rPr lang="pl-PL" dirty="0" smtClean="0"/>
+              <a:t>misje</a:t>
             </a:r>
             <a:endParaRPr lang="pl-PL" dirty="0"/>
           </a:p>
@@ -4565,6 +4582,295 @@
           </a:p>
         </p:txBody>
       </p:sp>
+    </p:spTree>
+    <p:extLst>
+      <p:ext uri="{BB962C8B-B14F-4D97-AF65-F5344CB8AC3E}">
+        <p14:creationId xmlns:p14="http://schemas.microsoft.com/office/powerpoint/2010/main" val="2148444960"/>
+      </p:ext>
+    </p:extLst>
+  </p:cSld>
+  <p:clrMapOvr>
+    <a:masterClrMapping/>
+  </p:clrMapOvr>
+</p:sld>
+</file>
+
+<file path=ppt/slides/slide16.xml><?xml version="1.0" encoding="utf-8"?>
+<p:sld xmlns:a="http://schemas.openxmlformats.org/drawingml/2006/main" xmlns:r="http://schemas.openxmlformats.org/officeDocument/2006/relationships" xmlns:p="http://schemas.openxmlformats.org/presentationml/2006/main">
+  <p:cSld>
+    <p:spTree>
+      <p:nvGrpSpPr>
+        <p:cNvPr id="1" name=""/>
+        <p:cNvGrpSpPr/>
+        <p:nvPr/>
+      </p:nvGrpSpPr>
+      <p:grpSpPr>
+        <a:xfrm>
+          <a:off x="0" y="0"/>
+          <a:ext cx="0" cy="0"/>
+          <a:chOff x="0" y="0"/>
+          <a:chExt cx="0" cy="0"/>
+        </a:xfrm>
+      </p:grpSpPr>
+      <p:sp>
+        <p:nvSpPr>
+          <p:cNvPr id="2" name="Title 1"/>
+          <p:cNvSpPr>
+            <a:spLocks noGrp="1"/>
+          </p:cNvSpPr>
+          <p:nvPr>
+            <p:ph type="title"/>
+          </p:nvPr>
+        </p:nvSpPr>
+        <p:spPr/>
+        <p:txBody>
+          <a:bodyPr/>
+          <a:lstStyle/>
+          <a:p>
+            <a:r>
+              <a:rPr lang="pl-PL" dirty="0" smtClean="0"/>
+              <a:t>Inne taktyki</a:t>
+            </a:r>
+            <a:endParaRPr lang="pl-PL" dirty="0"/>
+          </a:p>
+        </p:txBody>
+      </p:sp>
+      <p:sp>
+        <p:nvSpPr>
+          <p:cNvPr id="3" name="Content Placeholder 2"/>
+          <p:cNvSpPr>
+            <a:spLocks noGrp="1"/>
+          </p:cNvSpPr>
+          <p:nvPr>
+            <p:ph idx="1"/>
+          </p:nvPr>
+        </p:nvSpPr>
+        <p:spPr>
+          <a:xfrm>
+            <a:off x="457200" y="1340768"/>
+            <a:ext cx="7620000" cy="5400600"/>
+          </a:xfrm>
+        </p:spPr>
+        <p:txBody>
+          <a:bodyPr>
+            <a:normAutofit/>
+          </a:bodyPr>
+          <a:lstStyle/>
+          <a:p>
+            <a:r>
+              <a:rPr lang="pl-PL" dirty="0" smtClean="0"/>
+              <a:t>Interoperacyjność:</a:t>
+            </a:r>
+          </a:p>
+          <a:p>
+            <a:pPr lvl="1"/>
+            <a:r>
+              <a:rPr lang="pl-PL" dirty="0" smtClean="0"/>
+              <a:t>Service discovery - samoloty samodzielnie zgłaszają się do stacji </a:t>
+            </a:r>
+            <a:r>
+              <a:rPr lang="pl-PL" dirty="0" smtClean="0"/>
+              <a:t>kontroli</a:t>
+            </a:r>
+            <a:endParaRPr lang="pl-PL" dirty="0" smtClean="0"/>
+          </a:p>
+          <a:p>
+            <a:r>
+              <a:rPr lang="pl-PL" dirty="0" smtClean="0"/>
+              <a:t>Modyfikowalność:</a:t>
+            </a:r>
+          </a:p>
+          <a:p>
+            <a:pPr lvl="1"/>
+            <a:r>
+              <a:rPr lang="pl-PL" dirty="0" smtClean="0"/>
+              <a:t>Coupling reduction: </a:t>
+            </a:r>
+          </a:p>
+          <a:p>
+            <a:pPr lvl="2"/>
+            <a:r>
+              <a:rPr lang="pl-PL" dirty="0" smtClean="0"/>
+              <a:t>serwer stacji nie musi wiedzieć ilu jest klientów </a:t>
+            </a:r>
+            <a:r>
+              <a:rPr lang="pl-PL" dirty="0" smtClean="0"/>
+              <a:t>systemu</a:t>
+            </a:r>
+            <a:endParaRPr lang="pl-PL" dirty="0" smtClean="0"/>
+          </a:p>
+          <a:p>
+            <a:pPr lvl="2"/>
+            <a:r>
+              <a:rPr lang="pl-PL" dirty="0"/>
+              <a:t>s</a:t>
+            </a:r>
+            <a:r>
+              <a:rPr lang="pl-PL" dirty="0" smtClean="0"/>
+              <a:t>amolot nie musi wiedzieć o istnieniu klientów i serwera centralnego</a:t>
+            </a:r>
+          </a:p>
+          <a:p>
+            <a:pPr lvl="1"/>
+            <a:r>
+              <a:rPr lang="pl-PL" dirty="0" smtClean="0"/>
+              <a:t>Komunikacja przez pośrednika:</a:t>
+            </a:r>
+          </a:p>
+          <a:p>
+            <a:pPr lvl="2"/>
+            <a:r>
+              <a:rPr lang="pl-PL" dirty="0"/>
+              <a:t>w</a:t>
+            </a:r>
+            <a:r>
+              <a:rPr lang="pl-PL" dirty="0" smtClean="0"/>
+              <a:t>szelka komunikacja z samolotem następuje za pośrednictwem stacji </a:t>
+            </a:r>
+            <a:r>
+              <a:rPr lang="pl-PL" dirty="0" smtClean="0"/>
+              <a:t>kontrolnej</a:t>
+            </a:r>
+            <a:endParaRPr lang="pl-PL" dirty="0" smtClean="0"/>
+          </a:p>
+        </p:txBody>
+      </p:sp>
+      <p:sp>
+        <p:nvSpPr>
+          <p:cNvPr id="4" name="Slide Number Placeholder 3"/>
+          <p:cNvSpPr>
+            <a:spLocks noGrp="1"/>
+          </p:cNvSpPr>
+          <p:nvPr>
+            <p:ph type="sldNum" sz="quarter" idx="12"/>
+          </p:nvPr>
+        </p:nvSpPr>
+        <p:spPr/>
+        <p:txBody>
+          <a:bodyPr/>
+          <a:lstStyle/>
+          <a:p>
+            <a:fld id="{1F7F3A02-1D12-4D1D-B3D0-BE69B2FD8F86}" type="slidenum">
+              <a:rPr lang="pl-PL" smtClean="0"/>
+              <a:t>16</a:t>
+            </a:fld>
+            <a:endParaRPr lang="pl-PL"/>
+          </a:p>
+        </p:txBody>
+      </p:sp>
+    </p:spTree>
+    <p:extLst>
+      <p:ext uri="{BB962C8B-B14F-4D97-AF65-F5344CB8AC3E}">
+        <p14:creationId xmlns:p14="http://schemas.microsoft.com/office/powerpoint/2010/main" val="2757322131"/>
+      </p:ext>
+    </p:extLst>
+  </p:cSld>
+  <p:clrMapOvr>
+    <a:masterClrMapping/>
+  </p:clrMapOvr>
+  <p:timing>
+    <p:tnLst>
+      <p:par>
+        <p:cTn id="1" dur="indefinite" restart="never" nodeType="tmRoot"/>
+      </p:par>
+    </p:tnLst>
+  </p:timing>
+</p:sld>
+</file>
+
+<file path=ppt/slides/slide17.xml><?xml version="1.0" encoding="utf-8"?>
+<p:sld xmlns:a="http://schemas.openxmlformats.org/drawingml/2006/main" xmlns:r="http://schemas.openxmlformats.org/officeDocument/2006/relationships" xmlns:p="http://schemas.openxmlformats.org/presentationml/2006/main">
+  <p:cSld>
+    <p:spTree>
+      <p:nvGrpSpPr>
+        <p:cNvPr id="1" name=""/>
+        <p:cNvGrpSpPr/>
+        <p:nvPr/>
+      </p:nvGrpSpPr>
+      <p:grpSpPr>
+        <a:xfrm>
+          <a:off x="0" y="0"/>
+          <a:ext cx="0" cy="0"/>
+          <a:chOff x="0" y="0"/>
+          <a:chExt cx="0" cy="0"/>
+        </a:xfrm>
+      </p:grpSpPr>
+      <p:sp>
+        <p:nvSpPr>
+          <p:cNvPr id="2" name="Title 1"/>
+          <p:cNvSpPr>
+            <a:spLocks noGrp="1"/>
+          </p:cNvSpPr>
+          <p:nvPr>
+            <p:ph type="title"/>
+          </p:nvPr>
+        </p:nvSpPr>
+        <p:spPr/>
+        <p:txBody>
+          <a:bodyPr/>
+          <a:lstStyle/>
+          <a:p>
+            <a:r>
+              <a:rPr lang="pl-PL" dirty="0" smtClean="0"/>
+              <a:t>Decyzcje architektoniczne</a:t>
+            </a:r>
+            <a:endParaRPr lang="pl-PL" dirty="0"/>
+          </a:p>
+        </p:txBody>
+      </p:sp>
+      <p:sp>
+        <p:nvSpPr>
+          <p:cNvPr id="4" name="Slide Number Placeholder 3"/>
+          <p:cNvSpPr>
+            <a:spLocks noGrp="1"/>
+          </p:cNvSpPr>
+          <p:nvPr>
+            <p:ph type="sldNum" sz="quarter" idx="12"/>
+          </p:nvPr>
+        </p:nvSpPr>
+        <p:spPr/>
+        <p:txBody>
+          <a:bodyPr/>
+          <a:lstStyle/>
+          <a:p>
+            <a:fld id="{1F7F3A02-1D12-4D1D-B3D0-BE69B2FD8F86}" type="slidenum">
+              <a:rPr lang="pl-PL" smtClean="0"/>
+              <a:t>17</a:t>
+            </a:fld>
+            <a:endParaRPr lang="pl-PL"/>
+          </a:p>
+        </p:txBody>
+      </p:sp>
+      <p:pic>
+        <p:nvPicPr>
+          <p:cNvPr id="6" name="Picture 5"/>
+          <p:cNvPicPr>
+            <a:picLocks noChangeAspect="1"/>
+          </p:cNvPicPr>
+          <p:nvPr/>
+        </p:nvPicPr>
+        <p:blipFill>
+          <a:blip r:embed="rId2">
+            <a:extLst>
+              <a:ext uri="{28A0092B-C50C-407E-A947-70E740481C1C}">
+                <a14:useLocalDpi xmlns:a14="http://schemas.microsoft.com/office/drawing/2010/main" val="0"/>
+              </a:ext>
+            </a:extLst>
+          </a:blip>
+          <a:stretch>
+            <a:fillRect/>
+          </a:stretch>
+        </p:blipFill>
+        <p:spPr>
+          <a:xfrm>
+            <a:off x="72008" y="1560518"/>
+            <a:ext cx="8316416" cy="4388762"/>
+          </a:xfrm>
+          <a:prstGeom prst="rect">
+            <a:avLst/>
+          </a:prstGeom>
+        </p:spPr>
+      </p:pic>
     </p:spTree>
     <p:extLst>
       <p:ext uri="{BB962C8B-B14F-4D97-AF65-F5344CB8AC3E}">
@@ -4575,6 +4881,13 @@
   <p:clrMapOvr>
     <a:masterClrMapping/>
   </p:clrMapOvr>
+  <p:timing>
+    <p:tnLst>
+      <p:par>
+        <p:cTn id="1" dur="indefinite" restart="never" nodeType="tmRoot"/>
+      </p:par>
+    </p:tnLst>
+  </p:timing>
 </p:sld>
 </file>
 
@@ -4665,19 +4978,7 @@
           <a:p>
             <a:r>
               <a:rPr lang="pl-PL" dirty="0" smtClean="0"/>
-              <a:t>Kluczowe </a:t>
-            </a:r>
-            <a:r>
-              <a:rPr lang="pl-PL" dirty="0" smtClean="0"/>
-              <a:t>decyzcje </a:t>
-            </a:r>
-            <a:r>
-              <a:rPr lang="pl-PL" dirty="0" smtClean="0"/>
-              <a:t>architektoniczne (model MAD </a:t>
-            </a:r>
-            <a:r>
-              <a:rPr lang="pl-PL" dirty="0" smtClean="0"/>
-              <a:t>2.0</a:t>
+              <a:t>Kluczowe decyzcje architektoniczne (model MAD 2.0</a:t>
             </a:r>
             <a:r>
               <a:rPr lang="pl-PL" dirty="0"/>
@@ -4778,9 +5079,20 @@
           <a:bodyPr/>
           <a:lstStyle/>
           <a:p>
+            <a:pPr marL="114300" indent="0">
+              <a:buNone/>
+            </a:pPr>
             <a:r>
               <a:rPr lang="pl-PL" dirty="0"/>
-              <a:t>Naziemna stacja kontroli dla bezzałogowego samolotu Phoenix (http://lotniczapolska.pl/Projekt-PHOENIX-%E2%80%93-Bezzalogowy-Samolot-Stratosferyczny,10869). Naziemna stacja ma za zadanie zarządzanie misjami samolotu, przesyłanie do samolotu punktów nawigacyjnych, zamawianie misji, odbieranie i zarządzanie danymi zebranymi przez samolot(w tym udostepnianie zamawiającym). Samolot posiada na pokładzie awionikę, dzięki której jest w stanie autonomicznie prowadzić lot. Pokładowa awionika nie jest przedmiotem projektu.</a:t>
+              <a:t>Naziemna stacja kontroli dla bezzałogowego samolotu Phoenix (http://lotniczapolska.pl/Projekt-PHOENIX-%E2%80%93-Bezzalogowy-Samolot-Stratosferyczny,10869). Naziemna stacja ma za zadanie zarządzanie misjami samolotu, przesyłanie do samolotu punktów nawigacyjnych, zamawianie misji, odbieranie i zarządzanie danymi zebranymi przez </a:t>
+            </a:r>
+            <a:r>
+              <a:rPr lang="pl-PL" dirty="0" smtClean="0"/>
+              <a:t>samolot (</a:t>
+            </a:r>
+            <a:r>
+              <a:rPr lang="pl-PL" dirty="0"/>
+              <a:t>w tym udostepnianie zamawiającym). Samolot posiada na pokładzie awionikę, dzięki której jest w stanie autonomicznie prowadzić lot. Pokładowa awionika nie jest przedmiotem projektu.</a:t>
             </a:r>
           </a:p>
         </p:txBody>
@@ -4912,7 +5224,11 @@
           <a:p>
             <a:r>
               <a:rPr lang="pl-PL" dirty="0" smtClean="0"/>
-              <a:t>Implementacją systemu, na zlecenie Instytutu, zajmie się firma Pegasus Avionicus</a:t>
+              <a:t>Implementacją systemu, na zlecenie Instytutu, zajmie się firma Pegasus </a:t>
+            </a:r>
+            <a:r>
+              <a:rPr lang="pl-PL" dirty="0" smtClean="0"/>
+              <a:t>Avionicus</a:t>
             </a:r>
           </a:p>
           <a:p>
@@ -4920,14 +5236,6 @@
               <a:rPr lang="pl-PL" dirty="0" smtClean="0"/>
               <a:t>Ze względu na złożoność technologii, wszelkie zgłoszenia podmiotów zewnętrznych rozpatruje i zatwierdza (bądź  odrzuca) operator wyznaczony przez firmę Google</a:t>
             </a:r>
-          </a:p>
-          <a:p>
-            <a:r>
-              <a:rPr lang="pl-PL" dirty="0" smtClean="0"/>
-              <a:t>Pojedyncza stacja może obsługiwać wiele samolotów</a:t>
-            </a:r>
-          </a:p>
-          <a:p>
             <a:endParaRPr lang="pl-PL" dirty="0"/>
           </a:p>
         </p:txBody>
@@ -5002,7 +5310,7 @@
           <a:p>
             <a:r>
               <a:rPr lang="pl-PL" dirty="0" smtClean="0"/>
-              <a:t>Interesariusze</a:t>
+              <a:t>Wymagania</a:t>
             </a:r>
             <a:endParaRPr lang="pl-PL" dirty="0"/>
           </a:p>
@@ -5025,62 +5333,40 @@
           <a:p>
             <a:r>
               <a:rPr lang="pl-PL" dirty="0" smtClean="0"/>
-              <a:t>Klient: Instytut Lotnictwa</a:t>
-            </a:r>
-          </a:p>
-          <a:p>
-            <a:r>
-              <a:rPr lang="pl-PL" dirty="0" smtClean="0"/>
-              <a:t>Użytkownik: podmioty zewnętrzene (klienci firmy Google)</a:t>
-            </a:r>
-          </a:p>
-          <a:p>
-            <a:r>
-              <a:rPr lang="pl-PL" dirty="0" smtClean="0"/>
-              <a:t>Właściciel: firma Google</a:t>
-            </a:r>
-          </a:p>
-          <a:p>
-            <a:r>
-              <a:rPr lang="pl-PL" dirty="0" smtClean="0"/>
-              <a:t>Operator: podmiot rozpatrujący zgłoszenia Klientów</a:t>
-            </a:r>
-          </a:p>
-          <a:p>
-            <a:r>
-              <a:rPr lang="pl-PL" dirty="0" smtClean="0"/>
-              <a:t>Architekt: Zespół</a:t>
-            </a:r>
-          </a:p>
-          <a:p>
-            <a:r>
-              <a:rPr lang="pl-PL" dirty="0" smtClean="0"/>
-              <a:t>Deweloper: </a:t>
-            </a:r>
-            <a:r>
-              <a:rPr lang="pl-PL" dirty="0"/>
-              <a:t>Pegasus Avionicus</a:t>
-            </a:r>
-          </a:p>
-          <a:p>
-            <a:r>
-              <a:rPr lang="pl-PL" dirty="0" smtClean="0"/>
-              <a:t>Dostawca kompletnego systemu: </a:t>
-            </a:r>
-            <a:r>
-              <a:rPr lang="pl-PL" dirty="0"/>
-              <a:t>Instytut </a:t>
-            </a:r>
-            <a:r>
-              <a:rPr lang="pl-PL" dirty="0" smtClean="0"/>
-              <a:t>Lotnictwa</a:t>
-            </a:r>
-          </a:p>
-          <a:p>
-            <a:r>
-              <a:rPr lang="pl-PL" dirty="0" smtClean="0"/>
-              <a:t>Administrator: firma Google</a:t>
-            </a:r>
+              <a:t>Pojedyncza </a:t>
+            </a:r>
+            <a:r>
+              <a:rPr lang="pl-PL" dirty="0" smtClean="0"/>
+              <a:t>stacja </a:t>
+            </a:r>
+            <a:r>
+              <a:rPr lang="pl-PL" dirty="0" smtClean="0"/>
+              <a:t>obsługuje </a:t>
+            </a:r>
+            <a:r>
+              <a:rPr lang="pl-PL" dirty="0" smtClean="0"/>
+              <a:t>wiele </a:t>
+            </a:r>
+            <a:r>
+              <a:rPr lang="pl-PL" dirty="0" smtClean="0"/>
+              <a:t>samolotów</a:t>
+            </a:r>
+          </a:p>
+          <a:p>
+            <a:r>
+              <a:rPr lang="pl-PL" dirty="0" smtClean="0"/>
+              <a:t>Aplikacja kliencka wspiera wszystkie popularne systemy operacyjne (Windows, OS X, Ubuntu, Android, iOS, Windows Phone)</a:t>
+            </a:r>
+          </a:p>
+          <a:p>
+            <a:r>
+              <a:rPr lang="pl-PL" dirty="0" smtClean="0"/>
+              <a:t>Aplikacja kliencka jest dostępna dla użytkowników przez cały czas</a:t>
+            </a:r>
+            <a:endParaRPr lang="pl-PL" dirty="0" smtClean="0"/>
+          </a:p>
+          <a:p>
+            <a:endParaRPr lang="pl-PL" dirty="0" smtClean="0"/>
           </a:p>
           <a:p>
             <a:endParaRPr lang="pl-PL" dirty="0"/>
@@ -5113,7 +5399,7 @@
     </p:spTree>
     <p:extLst>
       <p:ext uri="{BB962C8B-B14F-4D97-AF65-F5344CB8AC3E}">
-        <p14:creationId xmlns:p14="http://schemas.microsoft.com/office/powerpoint/2010/main" val="1532331192"/>
+        <p14:creationId xmlns:p14="http://schemas.microsoft.com/office/powerpoint/2010/main" val="3062258622"/>
       </p:ext>
     </p:extLst>
   </p:cSld>
@@ -5156,13 +5442,88 @@
           <a:lstStyle/>
           <a:p>
             <a:r>
+              <a:rPr lang="pl-PL" dirty="0" smtClean="0"/>
+              <a:t>Interesariusze</a:t>
+            </a:r>
+            <a:endParaRPr lang="pl-PL" dirty="0"/>
+          </a:p>
+        </p:txBody>
+      </p:sp>
+      <p:sp>
+        <p:nvSpPr>
+          <p:cNvPr id="3" name="Content Placeholder 2"/>
+          <p:cNvSpPr>
+            <a:spLocks noGrp="1"/>
+          </p:cNvSpPr>
+          <p:nvPr>
+            <p:ph idx="1"/>
+          </p:nvPr>
+        </p:nvSpPr>
+        <p:spPr/>
+        <p:txBody>
+          <a:bodyPr/>
+          <a:lstStyle/>
+          <a:p>
+            <a:r>
+              <a:rPr lang="pl-PL" dirty="0" smtClean="0"/>
+              <a:t>Klient: Instytut Lotnictwa</a:t>
+            </a:r>
+          </a:p>
+          <a:p>
+            <a:r>
+              <a:rPr lang="pl-PL" dirty="0" smtClean="0"/>
+              <a:t>Użytkownik: podmioty zewnętrzene (klienci firmy Google)</a:t>
+            </a:r>
+          </a:p>
+          <a:p>
+            <a:r>
+              <a:rPr lang="pl-PL" dirty="0" smtClean="0"/>
+              <a:t>Właściciel: firma Google</a:t>
+            </a:r>
+          </a:p>
+          <a:p>
+            <a:r>
+              <a:rPr lang="pl-PL" dirty="0" smtClean="0"/>
+              <a:t>Operator: podmiot rozpatrujący zgłoszenia Klientów</a:t>
+            </a:r>
+          </a:p>
+          <a:p>
+            <a:r>
+              <a:rPr lang="pl-PL" dirty="0" smtClean="0"/>
+              <a:t>Architekt: Zespół</a:t>
+            </a:r>
+          </a:p>
+          <a:p>
+            <a:r>
+              <a:rPr lang="pl-PL" dirty="0" smtClean="0"/>
+              <a:t>Deweloper: </a:t>
+            </a:r>
+            <a:r>
               <a:rPr lang="pl-PL" dirty="0"/>
-              <a:t>4+1 </a:t>
-            </a:r>
-            <a:r>
-              <a:rPr lang="pl-PL" dirty="0" smtClean="0"/>
-              <a:t>Views: Scenarios</a:t>
-            </a:r>
+              <a:t>Pegasus Avionicus</a:t>
+            </a:r>
+          </a:p>
+          <a:p>
+            <a:r>
+              <a:rPr lang="pl-PL" dirty="0" smtClean="0"/>
+              <a:t>Dostawca kompletnego systemu: </a:t>
+            </a:r>
+            <a:r>
+              <a:rPr lang="pl-PL" dirty="0"/>
+              <a:t>Instytut </a:t>
+            </a:r>
+            <a:r>
+              <a:rPr lang="pl-PL" dirty="0" smtClean="0"/>
+              <a:t>Lotnictwa</a:t>
+            </a:r>
+          </a:p>
+          <a:p>
+            <a:r>
+              <a:rPr lang="pl-PL" dirty="0" smtClean="0"/>
+              <a:t>Administrator: firma Google</a:t>
+            </a:r>
+          </a:p>
+          <a:p>
             <a:endParaRPr lang="pl-PL" dirty="0"/>
           </a:p>
         </p:txBody>
@@ -5185,6 +5546,86 @@
             <a:fld id="{1F7F3A02-1D12-4D1D-B3D0-BE69B2FD8F86}" type="slidenum">
               <a:rPr lang="pl-PL" smtClean="0"/>
               <a:t>6</a:t>
+            </a:fld>
+            <a:endParaRPr lang="pl-PL"/>
+          </a:p>
+        </p:txBody>
+      </p:sp>
+    </p:spTree>
+    <p:extLst>
+      <p:ext uri="{BB962C8B-B14F-4D97-AF65-F5344CB8AC3E}">
+        <p14:creationId xmlns:p14="http://schemas.microsoft.com/office/powerpoint/2010/main" val="1532331192"/>
+      </p:ext>
+    </p:extLst>
+  </p:cSld>
+  <p:clrMapOvr>
+    <a:masterClrMapping/>
+  </p:clrMapOvr>
+</p:sld>
+</file>
+
+<file path=ppt/slides/slide7.xml><?xml version="1.0" encoding="utf-8"?>
+<p:sld xmlns:a="http://schemas.openxmlformats.org/drawingml/2006/main" xmlns:r="http://schemas.openxmlformats.org/officeDocument/2006/relationships" xmlns:p="http://schemas.openxmlformats.org/presentationml/2006/main">
+  <p:cSld>
+    <p:spTree>
+      <p:nvGrpSpPr>
+        <p:cNvPr id="1" name=""/>
+        <p:cNvGrpSpPr/>
+        <p:nvPr/>
+      </p:nvGrpSpPr>
+      <p:grpSpPr>
+        <a:xfrm>
+          <a:off x="0" y="0"/>
+          <a:ext cx="0" cy="0"/>
+          <a:chOff x="0" y="0"/>
+          <a:chExt cx="0" cy="0"/>
+        </a:xfrm>
+      </p:grpSpPr>
+      <p:sp>
+        <p:nvSpPr>
+          <p:cNvPr id="2" name="Title 1"/>
+          <p:cNvSpPr>
+            <a:spLocks noGrp="1"/>
+          </p:cNvSpPr>
+          <p:nvPr>
+            <p:ph type="title"/>
+          </p:nvPr>
+        </p:nvSpPr>
+        <p:spPr/>
+        <p:txBody>
+          <a:bodyPr/>
+          <a:lstStyle/>
+          <a:p>
+            <a:r>
+              <a:rPr lang="pl-PL" dirty="0"/>
+              <a:t>4+1 </a:t>
+            </a:r>
+            <a:r>
+              <a:rPr lang="pl-PL" dirty="0" smtClean="0"/>
+              <a:t>Views: Scenarios</a:t>
+            </a:r>
+            <a:endParaRPr lang="pl-PL" dirty="0"/>
+          </a:p>
+        </p:txBody>
+      </p:sp>
+      <p:sp>
+        <p:nvSpPr>
+          <p:cNvPr id="4" name="Slide Number Placeholder 3"/>
+          <p:cNvSpPr>
+            <a:spLocks noGrp="1"/>
+          </p:cNvSpPr>
+          <p:nvPr>
+            <p:ph type="sldNum" sz="quarter" idx="12"/>
+          </p:nvPr>
+        </p:nvSpPr>
+        <p:spPr/>
+        <p:txBody>
+          <a:bodyPr/>
+          <a:lstStyle/>
+          <a:p>
+            <a:fld id="{1F7F3A02-1D12-4D1D-B3D0-BE69B2FD8F86}" type="slidenum">
+              <a:rPr lang="pl-PL" smtClean="0"/>
+              <a:t>7</a:t>
             </a:fld>
             <a:endParaRPr lang="pl-PL"/>
           </a:p>
@@ -5233,7 +5674,7 @@
 </p:sld>
 </file>
 
-<file path=ppt/slides/slide7.xml><?xml version="1.0" encoding="utf-8"?>
+<file path=ppt/slides/slide8.xml><?xml version="1.0" encoding="utf-8"?>
 <p:sld xmlns:a="http://schemas.openxmlformats.org/drawingml/2006/main" xmlns:r="http://schemas.openxmlformats.org/officeDocument/2006/relationships" xmlns:p="http://schemas.openxmlformats.org/presentationml/2006/main">
   <p:cSld>
     <p:spTree>
@@ -5294,7 +5735,7 @@
           <a:p>
             <a:fld id="{1F7F3A02-1D12-4D1D-B3D0-BE69B2FD8F86}" type="slidenum">
               <a:rPr lang="pl-PL" smtClean="0"/>
-              <a:t>7</a:t>
+              <a:t>8</a:t>
             </a:fld>
             <a:endParaRPr lang="pl-PL"/>
           </a:p>
@@ -5350,7 +5791,7 @@
 </p:sld>
 </file>
 
-<file path=ppt/slides/slide8.xml><?xml version="1.0" encoding="utf-8"?>
+<file path=ppt/slides/slide9.xml><?xml version="1.0" encoding="utf-8"?>
 <p:sld xmlns:a="http://schemas.openxmlformats.org/drawingml/2006/main" xmlns:r="http://schemas.openxmlformats.org/officeDocument/2006/relationships" xmlns:p="http://schemas.openxmlformats.org/presentationml/2006/main">
   <p:cSld>
     <p:spTree>
@@ -5414,7 +5855,7 @@
           <a:p>
             <a:fld id="{1F7F3A02-1D12-4D1D-B3D0-BE69B2FD8F86}" type="slidenum">
               <a:rPr lang="pl-PL" smtClean="0"/>
-              <a:t>8</a:t>
+              <a:t>9</a:t>
             </a:fld>
             <a:endParaRPr lang="pl-PL"/>
           </a:p>
@@ -5459,122 +5900,6 @@
   <p:clrMapOvr>
     <a:masterClrMapping/>
   </p:clrMapOvr>
-</p:sld>
-</file>
-
-<file path=ppt/slides/slide9.xml><?xml version="1.0" encoding="utf-8"?>
-<p:sld xmlns:a="http://schemas.openxmlformats.org/drawingml/2006/main" xmlns:r="http://schemas.openxmlformats.org/officeDocument/2006/relationships" xmlns:p="http://schemas.openxmlformats.org/presentationml/2006/main">
-  <p:cSld>
-    <p:spTree>
-      <p:nvGrpSpPr>
-        <p:cNvPr id="1" name=""/>
-        <p:cNvGrpSpPr/>
-        <p:nvPr/>
-      </p:nvGrpSpPr>
-      <p:grpSpPr>
-        <a:xfrm>
-          <a:off x="0" y="0"/>
-          <a:ext cx="0" cy="0"/>
-          <a:chOff x="0" y="0"/>
-          <a:chExt cx="0" cy="0"/>
-        </a:xfrm>
-      </p:grpSpPr>
-      <p:sp>
-        <p:nvSpPr>
-          <p:cNvPr id="2" name="Title 1"/>
-          <p:cNvSpPr>
-            <a:spLocks noGrp="1"/>
-          </p:cNvSpPr>
-          <p:nvPr>
-            <p:ph type="title"/>
-          </p:nvPr>
-        </p:nvSpPr>
-        <p:spPr/>
-        <p:txBody>
-          <a:bodyPr/>
-          <a:lstStyle/>
-          <a:p>
-            <a:r>
-              <a:rPr lang="pl-PL" dirty="0"/>
-              <a:t>4+1 Views: </a:t>
-            </a:r>
-            <a:r>
-              <a:rPr lang="pl-PL" dirty="0" smtClean="0"/>
-              <a:t>Process View</a:t>
-            </a:r>
-            <a:endParaRPr lang="pl-PL" dirty="0"/>
-          </a:p>
-        </p:txBody>
-      </p:sp>
-      <p:sp>
-        <p:nvSpPr>
-          <p:cNvPr id="4" name="Slide Number Placeholder 3"/>
-          <p:cNvSpPr>
-            <a:spLocks noGrp="1"/>
-          </p:cNvSpPr>
-          <p:nvPr>
-            <p:ph type="sldNum" sz="quarter" idx="12"/>
-          </p:nvPr>
-        </p:nvSpPr>
-        <p:spPr/>
-        <p:txBody>
-          <a:bodyPr/>
-          <a:lstStyle/>
-          <a:p>
-            <a:fld id="{1F7F3A02-1D12-4D1D-B3D0-BE69B2FD8F86}" type="slidenum">
-              <a:rPr lang="pl-PL" smtClean="0"/>
-              <a:t>9</a:t>
-            </a:fld>
-            <a:endParaRPr lang="pl-PL"/>
-          </a:p>
-        </p:txBody>
-      </p:sp>
-      <p:pic>
-        <p:nvPicPr>
-          <p:cNvPr id="8" name="Content Placeholder 7"/>
-          <p:cNvPicPr>
-            <a:picLocks noGrp="1" noChangeAspect="1"/>
-          </p:cNvPicPr>
-          <p:nvPr>
-            <p:ph idx="1"/>
-          </p:nvPr>
-        </p:nvPicPr>
-        <p:blipFill>
-          <a:blip r:embed="rId2">
-            <a:extLst>
-              <a:ext uri="{28A0092B-C50C-407E-A947-70E740481C1C}">
-                <a14:useLocalDpi xmlns:a14="http://schemas.microsoft.com/office/drawing/2010/main" val="0"/>
-              </a:ext>
-            </a:extLst>
-          </a:blip>
-          <a:stretch>
-            <a:fillRect/>
-          </a:stretch>
-        </p:blipFill>
-        <p:spPr>
-          <a:xfrm>
-            <a:off x="107504" y="2132856"/>
-            <a:ext cx="8264025" cy="3198030"/>
-          </a:xfrm>
-        </p:spPr>
-      </p:pic>
-    </p:spTree>
-    <p:extLst>
-      <p:ext uri="{BB962C8B-B14F-4D97-AF65-F5344CB8AC3E}">
-        <p14:creationId xmlns:p14="http://schemas.microsoft.com/office/powerpoint/2010/main" val="740073496"/>
-      </p:ext>
-    </p:extLst>
-  </p:cSld>
-  <p:clrMapOvr>
-    <a:masterClrMapping/>
-  </p:clrMapOvr>
-  <p:timing>
-    <p:tnLst>
-      <p:par>
-        <p:cTn id="1" dur="indefinite" restart="never" nodeType="tmRoot"/>
-      </p:par>
-    </p:tnLst>
-  </p:timing>
 </p:sld>
 </file>
 

</xml_diff>

<commit_message>
AIS: Corrected some shitty diagram
</commit_message>
<xml_diff>
--- a/AIS/projekt/etap1/etap1.pptx
+++ b/AIS/projekt/etap1/etap1.pptx
@@ -4178,37 +4178,22 @@
             <a:pPr lvl="1"/>
             <a:r>
               <a:rPr lang="pl-PL" dirty="0" smtClean="0"/>
-              <a:t>Odpytywanie samolotu przez stację kontrolną co </a:t>
-            </a:r>
-            <a:r>
-              <a:rPr lang="pl-PL" dirty="0" smtClean="0"/>
-              <a:t>minutę</a:t>
-            </a:r>
-            <a:endParaRPr lang="pl-PL" dirty="0" smtClean="0"/>
+              <a:t>Odpytywanie samolotu przez stację kontrolną co minutę</a:t>
+            </a:r>
           </a:p>
           <a:p>
             <a:pPr lvl="1"/>
             <a:r>
               <a:rPr lang="pl-PL" dirty="0" smtClean="0"/>
-              <a:t>W przypadku braku odpowiedzi po 30 sekundach następuje powtórne </a:t>
-            </a:r>
-            <a:r>
-              <a:rPr lang="pl-PL" dirty="0" smtClean="0"/>
-              <a:t>odpytanie</a:t>
-            </a:r>
-            <a:endParaRPr lang="pl-PL" dirty="0" smtClean="0"/>
+              <a:t>W przypadku braku odpowiedzi po 30 sekundach następuje powtórne odpytanie</a:t>
+            </a:r>
           </a:p>
           <a:p>
             <a:pPr lvl="1"/>
             <a:r>
               <a:rPr lang="pl-PL" dirty="0" smtClean="0"/>
-              <a:t>Kolejny brak odpowiedzi skutkuje podniesieniem </a:t>
-            </a:r>
-            <a:r>
-              <a:rPr lang="pl-PL" dirty="0" smtClean="0"/>
-              <a:t>alarmu</a:t>
-            </a:r>
-            <a:endParaRPr lang="pl-PL" dirty="0" smtClean="0"/>
+              <a:t>Kolejny brak odpowiedzi skutkuje podniesieniem alarmu</a:t>
+            </a:r>
           </a:p>
           <a:p>
             <a:r>
@@ -4220,23 +4205,14 @@
             <a:pPr lvl="1"/>
             <a:r>
               <a:rPr lang="pl-PL" dirty="0" smtClean="0"/>
-              <a:t>Odpytywanie samolotu przez stację kontrolną co pół </a:t>
-            </a:r>
-            <a:r>
-              <a:rPr lang="pl-PL" dirty="0" smtClean="0"/>
-              <a:t>godziny</a:t>
-            </a:r>
-            <a:endParaRPr lang="pl-PL" dirty="0" smtClean="0"/>
+              <a:t>Odpytywanie samolotu przez stację kontrolną co pół godziny</a:t>
+            </a:r>
           </a:p>
           <a:p>
             <a:pPr lvl="1"/>
             <a:r>
               <a:rPr lang="pl-PL" dirty="0" smtClean="0"/>
-              <a:t>Stacja kontrolna odpytuje samolot o bieżącą pozycję i stan urządzeń </a:t>
-            </a:r>
-            <a:r>
-              <a:rPr lang="pl-PL" dirty="0" smtClean="0"/>
-              <a:t>pokładowych</a:t>
+              <a:t>Stacja kontrolna odpytuje samolot o bieżącą pozycję i stan urządzeń pokładowych</a:t>
             </a:r>
             <a:endParaRPr lang="pl-PL" dirty="0"/>
           </a:p>
@@ -4251,49 +4227,29 @@
             <a:pPr lvl="2"/>
             <a:r>
               <a:rPr lang="pl-PL" dirty="0" smtClean="0"/>
-              <a:t>Braku </a:t>
-            </a:r>
-            <a:r>
-              <a:rPr lang="pl-PL" dirty="0" smtClean="0"/>
-              <a:t>odpowiedzi</a:t>
-            </a:r>
-            <a:endParaRPr lang="pl-PL" dirty="0" smtClean="0"/>
+              <a:t>Braku odpowiedzi</a:t>
+            </a:r>
           </a:p>
           <a:p>
             <a:pPr lvl="2"/>
             <a:r>
               <a:rPr lang="pl-PL" dirty="0" smtClean="0"/>
-              <a:t>Znaczącej zmiany pozycji samolotu (prawdopodobna awaria GPS</a:t>
-            </a:r>
-            <a:r>
-              <a:rPr lang="pl-PL" dirty="0" smtClean="0"/>
-              <a:t>)</a:t>
-            </a:r>
-            <a:endParaRPr lang="pl-PL" dirty="0" smtClean="0"/>
+              <a:t>Znaczącej zmiany pozycji samolotu (prawdopodobna awaria GPS)</a:t>
+            </a:r>
           </a:p>
           <a:p>
             <a:pPr lvl="2"/>
             <a:r>
               <a:rPr lang="pl-PL" dirty="0" smtClean="0"/>
-              <a:t>Niezgodności pozycji z założeniami </a:t>
-            </a:r>
-            <a:r>
-              <a:rPr lang="pl-PL" dirty="0" smtClean="0"/>
-              <a:t>misji</a:t>
-            </a:r>
-            <a:endParaRPr lang="pl-PL" dirty="0" smtClean="0"/>
+              <a:t>Niezgodności pozycji z założeniami misji</a:t>
+            </a:r>
           </a:p>
           <a:p>
             <a:pPr lvl="2"/>
             <a:r>
               <a:rPr lang="pl-PL" dirty="0" smtClean="0"/>
-              <a:t>Komunikatu o błędnym działaniu urządzeń </a:t>
-            </a:r>
-            <a:r>
-              <a:rPr lang="pl-PL" dirty="0" smtClean="0"/>
-              <a:t>pokładowych</a:t>
-            </a:r>
-            <a:endParaRPr lang="pl-PL" dirty="0" smtClean="0"/>
+              <a:t>Komunikatu o błędnym działaniu urządzeń pokładowych</a:t>
+            </a:r>
           </a:p>
         </p:txBody>
       </p:sp>
@@ -4390,44 +4346,25 @@
           <a:p>
             <a:r>
               <a:rPr lang="pl-PL" dirty="0" smtClean="0"/>
-              <a:t>Redundancja serwerów aplikacji webowej celem wyeliminowania sytuacji, w której potencjalny klient nie może zgłosić </a:t>
-            </a:r>
-            <a:r>
-              <a:rPr lang="pl-PL" dirty="0" smtClean="0"/>
-              <a:t>misji</a:t>
-            </a:r>
-            <a:endParaRPr lang="pl-PL" dirty="0" smtClean="0"/>
-          </a:p>
-          <a:p>
-            <a:r>
-              <a:rPr lang="pl-PL" dirty="0" smtClean="0"/>
-              <a:t>Codzienne kopie zapasowe wszystkich baz danych przechowywane przez miesiąc </a:t>
-            </a:r>
-            <a:r>
-              <a:rPr lang="pl-PL" dirty="0" smtClean="0"/>
-              <a:t>czasu</a:t>
-            </a:r>
-            <a:endParaRPr lang="pl-PL" dirty="0" smtClean="0"/>
-          </a:p>
-          <a:p>
-            <a:r>
-              <a:rPr lang="pl-PL" dirty="0" smtClean="0"/>
-              <a:t>Redundancja danych w modułach operatora i stacji kontrolnej – przykładowo wykorzystanie macierzy </a:t>
-            </a:r>
-            <a:r>
-              <a:rPr lang="pl-PL" dirty="0" smtClean="0"/>
-              <a:t>RAID</a:t>
-            </a:r>
-            <a:endParaRPr lang="pl-PL" dirty="0" smtClean="0"/>
-          </a:p>
-          <a:p>
-            <a:r>
-              <a:rPr lang="pl-PL" dirty="0" smtClean="0"/>
-              <a:t>Zapobieganie awariom: jeśli podniesiony zostanie alarm dla samolotu, samolot ten przestaje być dostępny dla klientów (removal from service</a:t>
-            </a:r>
-            <a:r>
-              <a:rPr lang="pl-PL" dirty="0" smtClean="0"/>
-              <a:t>)</a:t>
+              <a:t>Redundancja serwerów aplikacji webowej celem wyeliminowania sytuacji, w której potencjalny klient nie może zgłosić misji</a:t>
+            </a:r>
+          </a:p>
+          <a:p>
+            <a:r>
+              <a:rPr lang="pl-PL" dirty="0" smtClean="0"/>
+              <a:t>Codzienne kopie zapasowe wszystkich baz danych przechowywane przez miesiąc czasu</a:t>
+            </a:r>
+          </a:p>
+          <a:p>
+            <a:r>
+              <a:rPr lang="pl-PL" dirty="0" smtClean="0"/>
+              <a:t>Redundancja danych w modułach operatora i stacji kontrolnej – przykładowo wykorzystanie macierzy RAID</a:t>
+            </a:r>
+          </a:p>
+          <a:p>
+            <a:r>
+              <a:rPr lang="pl-PL" dirty="0" smtClean="0"/>
+              <a:t>Zapobieganie awariom: jeśli podniesiony zostanie alarm dla samolotu, samolot ten przestaje być dostępny dla klientów (removal from service)</a:t>
             </a:r>
             <a:endParaRPr lang="pl-PL" dirty="0"/>
           </a:p>
@@ -4506,11 +4443,7 @@
           <a:p>
             <a:r>
               <a:rPr lang="pl-PL" dirty="0" smtClean="0"/>
-              <a:t>Taktyki </a:t>
-            </a:r>
-            <a:r>
-              <a:rPr lang="pl-PL" dirty="0" smtClean="0"/>
-              <a:t>wydajności</a:t>
+              <a:t>Taktyki wydajności</a:t>
             </a:r>
             <a:endParaRPr lang="pl-PL" dirty="0"/>
           </a:p>
@@ -4666,13 +4599,8 @@
             <a:pPr lvl="1"/>
             <a:r>
               <a:rPr lang="pl-PL" dirty="0" smtClean="0"/>
-              <a:t>Service discovery - samoloty samodzielnie zgłaszają się do stacji </a:t>
-            </a:r>
-            <a:r>
-              <a:rPr lang="pl-PL" dirty="0" smtClean="0"/>
-              <a:t>kontroli</a:t>
-            </a:r>
-            <a:endParaRPr lang="pl-PL" dirty="0" smtClean="0"/>
+              <a:t>Service discovery - samoloty samodzielnie zgłaszają się do stacji kontroli</a:t>
+            </a:r>
           </a:p>
           <a:p>
             <a:r>
@@ -4691,13 +4619,8 @@
             <a:pPr lvl="2"/>
             <a:r>
               <a:rPr lang="pl-PL" dirty="0" smtClean="0"/>
-              <a:t>serwer stacji nie musi wiedzieć ilu jest klientów </a:t>
-            </a:r>
-            <a:r>
-              <a:rPr lang="pl-PL" dirty="0" smtClean="0"/>
-              <a:t>systemu</a:t>
-            </a:r>
-            <a:endParaRPr lang="pl-PL" dirty="0" smtClean="0"/>
+              <a:t>serwer stacji nie musi wiedzieć ilu jest klientów systemu</a:t>
+            </a:r>
           </a:p>
           <a:p>
             <a:pPr lvl="2"/>
@@ -4725,13 +4648,8 @@
             </a:r>
             <a:r>
               <a:rPr lang="pl-PL" dirty="0" smtClean="0"/>
-              <a:t>szelka komunikacja z samolotem następuje za pośrednictwem stacji </a:t>
-            </a:r>
-            <a:r>
-              <a:rPr lang="pl-PL" dirty="0" smtClean="0"/>
-              <a:t>kontrolnej</a:t>
-            </a:r>
-            <a:endParaRPr lang="pl-PL" dirty="0" smtClean="0"/>
+              <a:t>szelka komunikacja z samolotem następuje za pośrednictwem stacji kontrolnej</a:t>
+            </a:r>
           </a:p>
         </p:txBody>
       </p:sp>
@@ -4843,7 +4761,7 @@
       </p:sp>
       <p:pic>
         <p:nvPicPr>
-          <p:cNvPr id="6" name="Picture 5"/>
+          <p:cNvPr id="3" name="Picture 2"/>
           <p:cNvPicPr>
             <a:picLocks noChangeAspect="1"/>
           </p:cNvPicPr>
@@ -4863,8 +4781,8 @@
         </p:blipFill>
         <p:spPr>
           <a:xfrm>
-            <a:off x="72008" y="1560518"/>
-            <a:ext cx="8316416" cy="4388762"/>
+            <a:off x="107504" y="1268760"/>
+            <a:ext cx="8209116" cy="5361434"/>
           </a:xfrm>
           <a:prstGeom prst="rect">
             <a:avLst/>
@@ -5224,11 +5142,7 @@
           <a:p>
             <a:r>
               <a:rPr lang="pl-PL" dirty="0" smtClean="0"/>
-              <a:t>Implementacją systemu, na zlecenie Instytutu, zajmie się firma Pegasus </a:t>
-            </a:r>
-            <a:r>
-              <a:rPr lang="pl-PL" dirty="0" smtClean="0"/>
-              <a:t>Avionicus</a:t>
+              <a:t>Implementacją systemu, na zlecenie Instytutu, zajmie się firma Pegasus Avionicus</a:t>
             </a:r>
           </a:p>
           <a:p>
@@ -5333,23 +5247,7 @@
           <a:p>
             <a:r>
               <a:rPr lang="pl-PL" dirty="0" smtClean="0"/>
-              <a:t>Pojedyncza </a:t>
-            </a:r>
-            <a:r>
-              <a:rPr lang="pl-PL" dirty="0" smtClean="0"/>
-              <a:t>stacja </a:t>
-            </a:r>
-            <a:r>
-              <a:rPr lang="pl-PL" dirty="0" smtClean="0"/>
-              <a:t>obsługuje </a:t>
-            </a:r>
-            <a:r>
-              <a:rPr lang="pl-PL" dirty="0" smtClean="0"/>
-              <a:t>wiele </a:t>
-            </a:r>
-            <a:r>
-              <a:rPr lang="pl-PL" dirty="0" smtClean="0"/>
-              <a:t>samolotów</a:t>
+              <a:t>Pojedyncza stacja obsługuje wiele samolotów</a:t>
             </a:r>
           </a:p>
           <a:p>
@@ -5363,7 +5261,6 @@
               <a:rPr lang="pl-PL" dirty="0" smtClean="0"/>
               <a:t>Aplikacja kliencka jest dostępna dla użytkowników przez cały czas</a:t>
             </a:r>
-            <a:endParaRPr lang="pl-PL" dirty="0" smtClean="0"/>
           </a:p>
           <a:p>
             <a:endParaRPr lang="pl-PL" dirty="0" smtClean="0"/>

</xml_diff>

<commit_message>
AIS: Added 'System scale' slide
</commit_message>
<xml_diff>
--- a/AIS/projekt/etap1/etap1.pptx
+++ b/AIS/projekt/etap1/etap1.pptx
@@ -5,26 +5,27 @@
     <p:sldMasterId id="2147483660" r:id="rId1"/>
   </p:sldMasterIdLst>
   <p:notesMasterIdLst>
-    <p:notesMasterId r:id="rId19"/>
+    <p:notesMasterId r:id="rId20"/>
   </p:notesMasterIdLst>
   <p:sldIdLst>
     <p:sldId id="256" r:id="rId2"/>
     <p:sldId id="257" r:id="rId3"/>
     <p:sldId id="260" r:id="rId4"/>
     <p:sldId id="259" r:id="rId5"/>
-    <p:sldId id="272" r:id="rId6"/>
-    <p:sldId id="258" r:id="rId7"/>
-    <p:sldId id="261" r:id="rId8"/>
-    <p:sldId id="262" r:id="rId9"/>
-    <p:sldId id="264" r:id="rId10"/>
-    <p:sldId id="263" r:id="rId11"/>
-    <p:sldId id="265" r:id="rId12"/>
-    <p:sldId id="266" r:id="rId13"/>
-    <p:sldId id="267" r:id="rId14"/>
-    <p:sldId id="268" r:id="rId15"/>
-    <p:sldId id="271" r:id="rId16"/>
-    <p:sldId id="269" r:id="rId17"/>
-    <p:sldId id="270" r:id="rId18"/>
+    <p:sldId id="258" r:id="rId6"/>
+    <p:sldId id="272" r:id="rId7"/>
+    <p:sldId id="273" r:id="rId8"/>
+    <p:sldId id="261" r:id="rId9"/>
+    <p:sldId id="262" r:id="rId10"/>
+    <p:sldId id="264" r:id="rId11"/>
+    <p:sldId id="263" r:id="rId12"/>
+    <p:sldId id="265" r:id="rId13"/>
+    <p:sldId id="266" r:id="rId14"/>
+    <p:sldId id="267" r:id="rId15"/>
+    <p:sldId id="268" r:id="rId16"/>
+    <p:sldId id="271" r:id="rId17"/>
+    <p:sldId id="269" r:id="rId18"/>
+    <p:sldId id="270" r:id="rId19"/>
   </p:sldIdLst>
   <p:sldSz cx="9144000" cy="6858000" type="screen4x3"/>
   <p:notesSz cx="6858000" cy="9144000"/>
@@ -3755,9 +3756,12 @@
             </a:r>
             <a:r>
               <a:rPr lang="pl-PL" dirty="0" smtClean="0"/>
-              <a:t>Process View</a:t>
-            </a:r>
-            <a:endParaRPr lang="pl-PL" dirty="0"/>
+              <a:t>Development </a:t>
+            </a:r>
+            <a:r>
+              <a:rPr lang="pl-PL" dirty="0"/>
+              <a:t>View</a:t>
+            </a:r>
           </a:p>
         </p:txBody>
       </p:sp>
@@ -3779,6 +3783,115 @@
             <a:fld id="{1F7F3A02-1D12-4D1D-B3D0-BE69B2FD8F86}" type="slidenum">
               <a:rPr lang="pl-PL" smtClean="0"/>
               <a:t>10</a:t>
+            </a:fld>
+            <a:endParaRPr lang="pl-PL"/>
+          </a:p>
+        </p:txBody>
+      </p:sp>
+      <p:pic>
+        <p:nvPicPr>
+          <p:cNvPr id="5" name="Content Placeholder 4"/>
+          <p:cNvPicPr>
+            <a:picLocks noGrp="1" noChangeAspect="1"/>
+          </p:cNvPicPr>
+          <p:nvPr>
+            <p:ph idx="1"/>
+          </p:nvPr>
+        </p:nvPicPr>
+        <p:blipFill>
+          <a:blip r:embed="rId2">
+            <a:extLst>
+              <a:ext uri="{28A0092B-C50C-407E-A947-70E740481C1C}">
+                <a14:useLocalDpi xmlns:a14="http://schemas.microsoft.com/office/drawing/2010/main" val="0"/>
+              </a:ext>
+            </a:extLst>
+          </a:blip>
+          <a:stretch>
+            <a:fillRect/>
+          </a:stretch>
+        </p:blipFill>
+        <p:spPr>
+          <a:xfrm>
+            <a:off x="3629509" y="1556792"/>
+            <a:ext cx="1086507" cy="4622778"/>
+          </a:xfrm>
+        </p:spPr>
+      </p:pic>
+    </p:spTree>
+    <p:extLst>
+      <p:ext uri="{BB962C8B-B14F-4D97-AF65-F5344CB8AC3E}">
+        <p14:creationId xmlns:p14="http://schemas.microsoft.com/office/powerpoint/2010/main" val="2331594138"/>
+      </p:ext>
+    </p:extLst>
+  </p:cSld>
+  <p:clrMapOvr>
+    <a:masterClrMapping/>
+  </p:clrMapOvr>
+</p:sld>
+</file>
+
+<file path=ppt/slides/slide11.xml><?xml version="1.0" encoding="utf-8"?>
+<p:sld xmlns:a="http://schemas.openxmlformats.org/drawingml/2006/main" xmlns:r="http://schemas.openxmlformats.org/officeDocument/2006/relationships" xmlns:p="http://schemas.openxmlformats.org/presentationml/2006/main">
+  <p:cSld>
+    <p:spTree>
+      <p:nvGrpSpPr>
+        <p:cNvPr id="1" name=""/>
+        <p:cNvGrpSpPr/>
+        <p:nvPr/>
+      </p:nvGrpSpPr>
+      <p:grpSpPr>
+        <a:xfrm>
+          <a:off x="0" y="0"/>
+          <a:ext cx="0" cy="0"/>
+          <a:chOff x="0" y="0"/>
+          <a:chExt cx="0" cy="0"/>
+        </a:xfrm>
+      </p:grpSpPr>
+      <p:sp>
+        <p:nvSpPr>
+          <p:cNvPr id="2" name="Title 1"/>
+          <p:cNvSpPr>
+            <a:spLocks noGrp="1"/>
+          </p:cNvSpPr>
+          <p:nvPr>
+            <p:ph type="title"/>
+          </p:nvPr>
+        </p:nvSpPr>
+        <p:spPr/>
+        <p:txBody>
+          <a:bodyPr/>
+          <a:lstStyle/>
+          <a:p>
+            <a:r>
+              <a:rPr lang="pl-PL" dirty="0"/>
+              <a:t>4+1 Views: </a:t>
+            </a:r>
+            <a:r>
+              <a:rPr lang="pl-PL" dirty="0" smtClean="0"/>
+              <a:t>Process View</a:t>
+            </a:r>
+            <a:endParaRPr lang="pl-PL" dirty="0"/>
+          </a:p>
+        </p:txBody>
+      </p:sp>
+      <p:sp>
+        <p:nvSpPr>
+          <p:cNvPr id="4" name="Slide Number Placeholder 3"/>
+          <p:cNvSpPr>
+            <a:spLocks noGrp="1"/>
+          </p:cNvSpPr>
+          <p:nvPr>
+            <p:ph type="sldNum" sz="quarter" idx="12"/>
+          </p:nvPr>
+        </p:nvSpPr>
+        <p:spPr/>
+        <p:txBody>
+          <a:bodyPr/>
+          <a:lstStyle/>
+          <a:p>
+            <a:fld id="{1F7F3A02-1D12-4D1D-B3D0-BE69B2FD8F86}" type="slidenum">
+              <a:rPr lang="pl-PL" smtClean="0"/>
+              <a:t>11</a:t>
             </a:fld>
             <a:endParaRPr lang="pl-PL"/>
           </a:p>
@@ -3833,7 +3946,7 @@
 </p:sld>
 </file>
 
-<file path=ppt/slides/slide11.xml><?xml version="1.0" encoding="utf-8"?>
+<file path=ppt/slides/slide12.xml><?xml version="1.0" encoding="utf-8"?>
 <p:sld xmlns:a="http://schemas.openxmlformats.org/drawingml/2006/main" xmlns:r="http://schemas.openxmlformats.org/officeDocument/2006/relationships" xmlns:p="http://schemas.openxmlformats.org/presentationml/2006/main">
   <p:cSld>
     <p:spTree>
@@ -3897,7 +4010,7 @@
           <a:p>
             <a:fld id="{1F7F3A02-1D12-4D1D-B3D0-BE69B2FD8F86}" type="slidenum">
               <a:rPr lang="pl-PL" smtClean="0"/>
-              <a:t>11</a:t>
+              <a:t>12</a:t>
             </a:fld>
             <a:endParaRPr lang="pl-PL"/>
           </a:p>
@@ -3953,162 +4066,6 @@
 </p:sld>
 </file>
 
-<file path=ppt/slides/slide12.xml><?xml version="1.0" encoding="utf-8"?>
-<p:sld xmlns:a="http://schemas.openxmlformats.org/drawingml/2006/main" xmlns:r="http://schemas.openxmlformats.org/officeDocument/2006/relationships" xmlns:p="http://schemas.openxmlformats.org/presentationml/2006/main">
-  <p:cSld>
-    <p:spTree>
-      <p:nvGrpSpPr>
-        <p:cNvPr id="1" name=""/>
-        <p:cNvGrpSpPr/>
-        <p:nvPr/>
-      </p:nvGrpSpPr>
-      <p:grpSpPr>
-        <a:xfrm>
-          <a:off x="0" y="0"/>
-          <a:ext cx="0" cy="0"/>
-          <a:chOff x="0" y="0"/>
-          <a:chExt cx="0" cy="0"/>
-        </a:xfrm>
-      </p:grpSpPr>
-      <p:sp>
-        <p:nvSpPr>
-          <p:cNvPr id="2" name="Title 1"/>
-          <p:cNvSpPr>
-            <a:spLocks noGrp="1"/>
-          </p:cNvSpPr>
-          <p:nvPr>
-            <p:ph type="title"/>
-          </p:nvPr>
-        </p:nvSpPr>
-        <p:spPr/>
-        <p:txBody>
-          <a:bodyPr/>
-          <a:lstStyle/>
-          <a:p>
-            <a:r>
-              <a:rPr lang="pl-PL" dirty="0" smtClean="0"/>
-              <a:t>Wzorce architektoniczne</a:t>
-            </a:r>
-            <a:endParaRPr lang="pl-PL" dirty="0"/>
-          </a:p>
-        </p:txBody>
-      </p:sp>
-      <p:sp>
-        <p:nvSpPr>
-          <p:cNvPr id="3" name="Content Placeholder 2"/>
-          <p:cNvSpPr>
-            <a:spLocks noGrp="1"/>
-          </p:cNvSpPr>
-          <p:nvPr>
-            <p:ph idx="1"/>
-          </p:nvPr>
-        </p:nvSpPr>
-        <p:spPr/>
-        <p:txBody>
-          <a:bodyPr>
-            <a:normAutofit lnSpcReduction="10000"/>
-          </a:bodyPr>
-          <a:lstStyle/>
-          <a:p>
-            <a:r>
-              <a:rPr lang="pl-PL" dirty="0" smtClean="0"/>
-              <a:t>Dwóch brokerów w procesie zlecania misji:</a:t>
-            </a:r>
-          </a:p>
-          <a:p>
-            <a:pPr lvl="1"/>
-            <a:r>
-              <a:rPr lang="pl-PL" dirty="0" smtClean="0"/>
-              <a:t>Pierwszy broker: operator </a:t>
-            </a:r>
-          </a:p>
-          <a:p>
-            <a:pPr lvl="1"/>
-            <a:r>
-              <a:rPr lang="pl-PL" dirty="0" smtClean="0"/>
-              <a:t>Drugi broker: stacja kontroli</a:t>
-            </a:r>
-          </a:p>
-          <a:p>
-            <a:r>
-              <a:rPr lang="pl-PL" dirty="0" smtClean="0"/>
-              <a:t>Architektura publikuj-i-zarejestruj-się – użytkownik publikuje misję samolotu i rejestruje się jako odbiorca związanych z nią danych</a:t>
-            </a:r>
-          </a:p>
-          <a:p>
-            <a:r>
-              <a:rPr lang="pl-PL" dirty="0" smtClean="0"/>
-              <a:t>Serwer centralny pełni rolę magistrali</a:t>
-            </a:r>
-          </a:p>
-          <a:p>
-            <a:r>
-              <a:rPr lang="pl-PL" dirty="0" smtClean="0"/>
-              <a:t>Implementacja komunikacji moduł kliencki – moduł operatora/samolot realizuje architekturę klient – serwer</a:t>
-            </a:r>
-          </a:p>
-          <a:p>
-            <a:r>
-              <a:rPr lang="pl-PL" dirty="0" smtClean="0"/>
-              <a:t>Realizacja wzorca MVC</a:t>
-            </a:r>
-          </a:p>
-          <a:p>
-            <a:pPr lvl="1"/>
-            <a:r>
-              <a:rPr lang="pl-PL" dirty="0" smtClean="0"/>
-              <a:t>Modelem jest lokalna baza danych danych stacji</a:t>
-            </a:r>
-          </a:p>
-          <a:p>
-            <a:pPr lvl="1"/>
-            <a:r>
-              <a:rPr lang="pl-PL" dirty="0"/>
-              <a:t>Stacja kontrola udostępnia użytkownikowi widok danych misji – jest zatem </a:t>
-            </a:r>
-            <a:r>
-              <a:rPr lang="pl-PL" dirty="0" smtClean="0"/>
-              <a:t>kontrolerem</a:t>
-            </a:r>
-          </a:p>
-        </p:txBody>
-      </p:sp>
-      <p:sp>
-        <p:nvSpPr>
-          <p:cNvPr id="4" name="Slide Number Placeholder 3"/>
-          <p:cNvSpPr>
-            <a:spLocks noGrp="1"/>
-          </p:cNvSpPr>
-          <p:nvPr>
-            <p:ph type="sldNum" sz="quarter" idx="12"/>
-          </p:nvPr>
-        </p:nvSpPr>
-        <p:spPr/>
-        <p:txBody>
-          <a:bodyPr/>
-          <a:lstStyle/>
-          <a:p>
-            <a:fld id="{1F7F3A02-1D12-4D1D-B3D0-BE69B2FD8F86}" type="slidenum">
-              <a:rPr lang="pl-PL" smtClean="0"/>
-              <a:t>12</a:t>
-            </a:fld>
-            <a:endParaRPr lang="pl-PL"/>
-          </a:p>
-        </p:txBody>
-      </p:sp>
-    </p:spTree>
-    <p:extLst>
-      <p:ext uri="{BB962C8B-B14F-4D97-AF65-F5344CB8AC3E}">
-        <p14:creationId xmlns:p14="http://schemas.microsoft.com/office/powerpoint/2010/main" val="707875789"/>
-      </p:ext>
-    </p:extLst>
-  </p:cSld>
-  <p:clrMapOvr>
-    <a:masterClrMapping/>
-  </p:clrMapOvr>
-</p:sld>
-</file>
-
 <file path=ppt/slides/slide13.xml><?xml version="1.0" encoding="utf-8"?>
 <p:sld xmlns:a="http://schemas.openxmlformats.org/drawingml/2006/main" xmlns:r="http://schemas.openxmlformats.org/officeDocument/2006/relationships" xmlns:p="http://schemas.openxmlformats.org/presentationml/2006/main">
   <p:cSld>
@@ -4143,7 +4100,7 @@
           <a:p>
             <a:r>
               <a:rPr lang="pl-PL" dirty="0" smtClean="0"/>
-              <a:t>Taktyki dostępności (I)</a:t>
+              <a:t>Wzorce architektoniczne</a:t>
             </a:r>
             <a:endParaRPr lang="pl-PL" dirty="0"/>
           </a:p>
@@ -4159,96 +4116,118 @@
             <p:ph idx="1"/>
           </p:nvPr>
         </p:nvSpPr>
-        <p:spPr>
-          <a:xfrm>
-            <a:off x="467544" y="1412776"/>
-            <a:ext cx="7620000" cy="5069160"/>
-          </a:xfrm>
-        </p:spPr>
-        <p:txBody>
-          <a:bodyPr/>
-          <a:lstStyle/>
-          <a:p>
-            <a:r>
-              <a:rPr lang="pl-PL" dirty="0" smtClean="0"/>
-              <a:t>Ping/echo:</a:t>
+        <p:spPr/>
+        <p:txBody>
+          <a:bodyPr>
+            <a:normAutofit lnSpcReduction="10000"/>
+          </a:bodyPr>
+          <a:lstStyle/>
+          <a:p>
+            <a:r>
+              <a:rPr lang="pl-PL" dirty="0" smtClean="0"/>
+              <a:t>Dwóch brokerów w procesie zlecania misji:</a:t>
             </a:r>
           </a:p>
           <a:p>
             <a:pPr lvl="1"/>
             <a:r>
               <a:rPr lang="pl-PL" dirty="0" smtClean="0"/>
-              <a:t>Odpytywanie samolotu przez stację kontrolną co minutę</a:t>
-            </a:r>
+              <a:t>Pierwszy broker: </a:t>
+            </a:r>
+            <a:r>
+              <a:rPr lang="pl-PL" dirty="0" smtClean="0"/>
+              <a:t>Operator </a:t>
+            </a:r>
+            <a:endParaRPr lang="pl-PL" dirty="0" smtClean="0"/>
           </a:p>
           <a:p>
             <a:pPr lvl="1"/>
             <a:r>
               <a:rPr lang="pl-PL" dirty="0" smtClean="0"/>
-              <a:t>W przypadku braku odpowiedzi po 30 sekundach następuje powtórne odpytanie</a:t>
+              <a:t>Drugi broker: </a:t>
+            </a:r>
+            <a:r>
+              <a:rPr lang="pl-PL" dirty="0" smtClean="0"/>
+              <a:t>Stacja Kontroli</a:t>
+            </a:r>
+            <a:endParaRPr lang="pl-PL" dirty="0" smtClean="0"/>
+          </a:p>
+          <a:p>
+            <a:r>
+              <a:rPr lang="pl-PL" dirty="0" smtClean="0"/>
+              <a:t>Architektura publikuj-i-zarejestruj-się </a:t>
+            </a:r>
+            <a:r>
+              <a:rPr lang="pl-PL" dirty="0" smtClean="0"/>
+              <a:t>–Użytkownik </a:t>
+            </a:r>
+            <a:r>
+              <a:rPr lang="pl-PL" dirty="0" smtClean="0"/>
+              <a:t>publikuje misję </a:t>
+            </a:r>
+            <a:r>
+              <a:rPr lang="pl-PL" dirty="0" smtClean="0"/>
+              <a:t>Samolotu </a:t>
+            </a:r>
+            <a:r>
+              <a:rPr lang="pl-PL" dirty="0" smtClean="0"/>
+              <a:t>i rejestruje się jako odbiorca związanych z nią danych</a:t>
+            </a:r>
+          </a:p>
+          <a:p>
+            <a:r>
+              <a:rPr lang="pl-PL" dirty="0" smtClean="0"/>
+              <a:t>Serwer centralny pełni rolę magistrali</a:t>
+            </a:r>
+          </a:p>
+          <a:p>
+            <a:r>
+              <a:rPr lang="pl-PL" dirty="0" smtClean="0"/>
+              <a:t>Implementacja komunikacji moduł kliencki – moduł </a:t>
+            </a:r>
+            <a:r>
+              <a:rPr lang="pl-PL" dirty="0"/>
+              <a:t>O</a:t>
+            </a:r>
+            <a:r>
+              <a:rPr lang="pl-PL" dirty="0" smtClean="0"/>
+              <a:t>peratora/Samolot </a:t>
+            </a:r>
+            <a:r>
+              <a:rPr lang="pl-PL" dirty="0" smtClean="0"/>
+              <a:t>realizuje architekturę klient – serwer</a:t>
+            </a:r>
+          </a:p>
+          <a:p>
+            <a:r>
+              <a:rPr lang="pl-PL" dirty="0" smtClean="0"/>
+              <a:t>Realizacja wzorca MVC</a:t>
             </a:r>
           </a:p>
           <a:p>
             <a:pPr lvl="1"/>
             <a:r>
               <a:rPr lang="pl-PL" dirty="0" smtClean="0"/>
-              <a:t>Kolejny brak odpowiedzi skutkuje podniesieniem alarmu</a:t>
-            </a:r>
-          </a:p>
-          <a:p>
-            <a:r>
-              <a:rPr lang="pl-PL" dirty="0" smtClean="0"/>
-              <a:t>Self-test: </a:t>
+              <a:t>Modelem jest lokalna baza danych danych stacji</a:t>
             </a:r>
           </a:p>
           <a:p>
             <a:pPr lvl="1"/>
             <a:r>
-              <a:rPr lang="pl-PL" dirty="0" smtClean="0"/>
-              <a:t>Odpytywanie samolotu przez stację kontrolną co pół godziny</a:t>
-            </a:r>
-          </a:p>
-          <a:p>
-            <a:pPr lvl="1"/>
-            <a:r>
-              <a:rPr lang="pl-PL" dirty="0" smtClean="0"/>
-              <a:t>Stacja kontrolna odpytuje samolot o bieżącą pozycję i stan urządzeń pokładowych</a:t>
-            </a:r>
-            <a:endParaRPr lang="pl-PL" dirty="0"/>
-          </a:p>
-          <a:p>
-            <a:pPr lvl="1"/>
-            <a:r>
-              <a:rPr lang="pl-PL" dirty="0" smtClean="0"/>
-              <a:t>Alarm podnoszony jest w przypadku:</a:t>
-            </a:r>
-          </a:p>
-          <a:p>
-            <a:pPr lvl="2"/>
-            <a:r>
-              <a:rPr lang="pl-PL" dirty="0" smtClean="0"/>
-              <a:t>Braku odpowiedzi</a:t>
-            </a:r>
-          </a:p>
-          <a:p>
-            <a:pPr lvl="2"/>
-            <a:r>
-              <a:rPr lang="pl-PL" dirty="0" smtClean="0"/>
-              <a:t>Znaczącej zmiany pozycji samolotu (prawdopodobna awaria GPS)</a:t>
-            </a:r>
-          </a:p>
-          <a:p>
-            <a:pPr lvl="2"/>
-            <a:r>
-              <a:rPr lang="pl-PL" dirty="0" smtClean="0"/>
-              <a:t>Niezgodności pozycji z założeniami misji</a:t>
-            </a:r>
-          </a:p>
-          <a:p>
-            <a:pPr lvl="2"/>
-            <a:r>
-              <a:rPr lang="pl-PL" dirty="0" smtClean="0"/>
-              <a:t>Komunikatu o błędnym działaniu urządzeń pokładowych</a:t>
+              <a:rPr lang="pl-PL" dirty="0"/>
+              <a:t>Stacja kontrola udostępnia </a:t>
+            </a:r>
+            <a:r>
+              <a:rPr lang="pl-PL" dirty="0" smtClean="0"/>
+              <a:t>Użytkownikowi </a:t>
+            </a:r>
+            <a:r>
+              <a:rPr lang="pl-PL" dirty="0"/>
+              <a:t>widok danych misji – jest zatem </a:t>
+            </a:r>
+            <a:r>
+              <a:rPr lang="pl-PL" dirty="0" smtClean="0"/>
+              <a:t>kontrolerem</a:t>
             </a:r>
           </a:p>
         </p:txBody>
@@ -4279,7 +4258,7 @@
     </p:spTree>
     <p:extLst>
       <p:ext uri="{BB962C8B-B14F-4D97-AF65-F5344CB8AC3E}">
-        <p14:creationId xmlns:p14="http://schemas.microsoft.com/office/powerpoint/2010/main" val="3083557138"/>
+        <p14:creationId xmlns:p14="http://schemas.microsoft.com/office/powerpoint/2010/main" val="707875789"/>
       </p:ext>
     </p:extLst>
   </p:cSld>
@@ -4323,7 +4302,7 @@
           <a:p>
             <a:r>
               <a:rPr lang="pl-PL" dirty="0" smtClean="0"/>
-              <a:t>Taktyki dostępności (II)</a:t>
+              <a:t>Taktyki dostępności (I)</a:t>
             </a:r>
             <a:endParaRPr lang="pl-PL" dirty="0"/>
           </a:p>
@@ -4339,37 +4318,173 @@
             <p:ph idx="1"/>
           </p:nvPr>
         </p:nvSpPr>
-        <p:spPr/>
-        <p:txBody>
-          <a:bodyPr/>
-          <a:lstStyle/>
-          <a:p>
-            <a:r>
-              <a:rPr lang="pl-PL" dirty="0" smtClean="0"/>
-              <a:t>Redundancja serwerów aplikacji webowej celem wyeliminowania sytuacji, w której potencjalny klient nie może zgłosić misji</a:t>
-            </a:r>
-          </a:p>
-          <a:p>
-            <a:r>
-              <a:rPr lang="pl-PL" dirty="0" smtClean="0"/>
-              <a:t>Codzienne kopie zapasowe wszystkich baz danych przechowywane przez miesiąc czasu</a:t>
-            </a:r>
-          </a:p>
-          <a:p>
-            <a:r>
-              <a:rPr lang="pl-PL" dirty="0" smtClean="0"/>
-              <a:t>Redundancja danych w modułach operatora i stacji kontrolnej – przykładowo wykorzystanie macierzy RAID</a:t>
-            </a:r>
-          </a:p>
-          <a:p>
-            <a:r>
-              <a:rPr lang="pl-PL" dirty="0" smtClean="0"/>
-              <a:t>Zapobieganie awariom: jeśli podniesiony zostanie alarm dla samolotu, samolot ten przestaje być dostępny dla klientów (removal from service)</a:t>
+        <p:spPr>
+          <a:xfrm>
+            <a:off x="467544" y="1412776"/>
+            <a:ext cx="7620000" cy="5069160"/>
+          </a:xfrm>
+        </p:spPr>
+        <p:txBody>
+          <a:bodyPr/>
+          <a:lstStyle/>
+          <a:p>
+            <a:r>
+              <a:rPr lang="pl-PL" dirty="0" smtClean="0"/>
+              <a:t>Ping/echo:</a:t>
+            </a:r>
+          </a:p>
+          <a:p>
+            <a:pPr lvl="1"/>
+            <a:r>
+              <a:rPr lang="pl-PL" dirty="0" smtClean="0"/>
+              <a:t>Odpytywanie </a:t>
+            </a:r>
+            <a:r>
+              <a:rPr lang="pl-PL" dirty="0" smtClean="0"/>
+              <a:t>Samolotu </a:t>
+            </a:r>
+            <a:r>
+              <a:rPr lang="pl-PL" dirty="0" smtClean="0"/>
+              <a:t>przez </a:t>
+            </a:r>
+            <a:r>
+              <a:rPr lang="pl-PL" dirty="0" smtClean="0"/>
+              <a:t>Stację </a:t>
+            </a:r>
+            <a:r>
+              <a:rPr lang="pl-PL" dirty="0" smtClean="0"/>
+              <a:t>K</a:t>
+            </a:r>
+            <a:r>
+              <a:rPr lang="pl-PL" dirty="0" smtClean="0"/>
+              <a:t>ontroli </a:t>
+            </a:r>
+            <a:r>
+              <a:rPr lang="pl-PL" dirty="0" smtClean="0"/>
+              <a:t>co minutę</a:t>
+            </a:r>
+          </a:p>
+          <a:p>
+            <a:pPr lvl="1"/>
+            <a:r>
+              <a:rPr lang="pl-PL" dirty="0" smtClean="0"/>
+              <a:t>W przypadku braku odpowiedzi po 30 sekundach następuje powtórne odpytanie</a:t>
+            </a:r>
+          </a:p>
+          <a:p>
+            <a:pPr lvl="1"/>
+            <a:r>
+              <a:rPr lang="pl-PL" dirty="0" smtClean="0"/>
+              <a:t>Kolejny brak odpowiedzi skutkuje podniesieniem alarmu</a:t>
+            </a:r>
+          </a:p>
+          <a:p>
+            <a:r>
+              <a:rPr lang="pl-PL" dirty="0" smtClean="0"/>
+              <a:t>Self-test: </a:t>
+            </a:r>
+          </a:p>
+          <a:p>
+            <a:pPr lvl="1"/>
+            <a:r>
+              <a:rPr lang="pl-PL" dirty="0" smtClean="0"/>
+              <a:t>Odpytywanie </a:t>
+            </a:r>
+            <a:r>
+              <a:rPr lang="pl-PL" dirty="0" smtClean="0"/>
+              <a:t>Samolotu </a:t>
+            </a:r>
+            <a:r>
+              <a:rPr lang="pl-PL" dirty="0" smtClean="0"/>
+              <a:t>przez </a:t>
+            </a:r>
+            <a:r>
+              <a:rPr lang="pl-PL" dirty="0"/>
+              <a:t>S</a:t>
+            </a:r>
+            <a:r>
+              <a:rPr lang="pl-PL" dirty="0" smtClean="0"/>
+              <a:t>tację </a:t>
+            </a:r>
+            <a:r>
+              <a:rPr lang="pl-PL" dirty="0" smtClean="0"/>
+              <a:t>K</a:t>
+            </a:r>
+            <a:r>
+              <a:rPr lang="pl-PL" dirty="0" smtClean="0"/>
+              <a:t>ontroli </a:t>
+            </a:r>
+            <a:r>
+              <a:rPr lang="pl-PL" dirty="0" smtClean="0"/>
+              <a:t>co pół godziny</a:t>
+            </a:r>
+          </a:p>
+          <a:p>
+            <a:pPr lvl="1"/>
+            <a:r>
+              <a:rPr lang="pl-PL" dirty="0" smtClean="0"/>
+              <a:t>Stacja </a:t>
+            </a:r>
+            <a:r>
+              <a:rPr lang="pl-PL" dirty="0" smtClean="0"/>
+              <a:t>Kontroli </a:t>
+            </a:r>
+            <a:r>
+              <a:rPr lang="pl-PL" dirty="0" smtClean="0"/>
+              <a:t>odpytuje </a:t>
+            </a:r>
+            <a:r>
+              <a:rPr lang="pl-PL" dirty="0" smtClean="0"/>
+              <a:t>Samolot </a:t>
+            </a:r>
+            <a:r>
+              <a:rPr lang="pl-PL" dirty="0" smtClean="0"/>
+              <a:t>o bieżącą pozycję i stan urządzeń pokładowych</a:t>
             </a:r>
             <a:endParaRPr lang="pl-PL" dirty="0"/>
           </a:p>
           <a:p>
-            <a:endParaRPr lang="pl-PL" dirty="0" smtClean="0"/>
+            <a:pPr lvl="1"/>
+            <a:r>
+              <a:rPr lang="pl-PL" dirty="0" smtClean="0"/>
+              <a:t>Alarm podnoszony jest w przypadku:</a:t>
+            </a:r>
+          </a:p>
+          <a:p>
+            <a:pPr lvl="2"/>
+            <a:r>
+              <a:rPr lang="pl-PL" dirty="0" smtClean="0"/>
+              <a:t>Braku odpowiedzi</a:t>
+            </a:r>
+          </a:p>
+          <a:p>
+            <a:pPr lvl="2"/>
+            <a:r>
+              <a:rPr lang="pl-PL" dirty="0" smtClean="0"/>
+              <a:t>Znaczącej zmiany pozycji </a:t>
+            </a:r>
+            <a:r>
+              <a:rPr lang="pl-PL" dirty="0" smtClean="0"/>
+              <a:t>Samolotu </a:t>
+            </a:r>
+            <a:r>
+              <a:rPr lang="pl-PL" dirty="0" smtClean="0"/>
+              <a:t>(prawdopodobna awaria GPS)</a:t>
+            </a:r>
+          </a:p>
+          <a:p>
+            <a:pPr lvl="2"/>
+            <a:r>
+              <a:rPr lang="pl-PL" dirty="0" smtClean="0"/>
+              <a:t>Niezgodności pozycji z założeniami misji</a:t>
+            </a:r>
+          </a:p>
+          <a:p>
+            <a:pPr lvl="2"/>
+            <a:r>
+              <a:rPr lang="pl-PL" dirty="0" smtClean="0"/>
+              <a:t>Komunikatu o błędnym działaniu urządzeń pokładowych</a:t>
+            </a:r>
           </a:p>
         </p:txBody>
       </p:sp>
@@ -4399,7 +4514,7 @@
     </p:spTree>
     <p:extLst>
       <p:ext uri="{BB962C8B-B14F-4D97-AF65-F5344CB8AC3E}">
-        <p14:creationId xmlns:p14="http://schemas.microsoft.com/office/powerpoint/2010/main" val="377667798"/>
+        <p14:creationId xmlns:p14="http://schemas.microsoft.com/office/powerpoint/2010/main" val="3083557138"/>
       </p:ext>
     </p:extLst>
   </p:cSld>
@@ -4443,7 +4558,7 @@
           <a:p>
             <a:r>
               <a:rPr lang="pl-PL" dirty="0" smtClean="0"/>
-              <a:t>Taktyki wydajności</a:t>
+              <a:t>Taktyki dostępności (II)</a:t>
             </a:r>
             <a:endParaRPr lang="pl-PL" dirty="0"/>
           </a:p>
@@ -4466,29 +4581,102 @@
           <a:p>
             <a:r>
               <a:rPr lang="pl-PL" dirty="0" smtClean="0"/>
-              <a:t>Ograniczenie </a:t>
+              <a:t>Redundancja </a:t>
+            </a:r>
+            <a:r>
+              <a:rPr lang="pl-PL" dirty="0" smtClean="0"/>
+              <a:t>Serwerów </a:t>
             </a:r>
             <a:r>
               <a:rPr lang="pl-PL" dirty="0"/>
-              <a:t>narzutów: samolot komunikuje się jedynie ze stacją kontrolną, co pozwala osiągnąć wydajne sterowanie jego lotem</a:t>
-            </a:r>
-          </a:p>
-          <a:p>
+              <a:t>A</a:t>
+            </a:r>
+            <a:r>
+              <a:rPr lang="pl-PL" dirty="0" smtClean="0"/>
+              <a:t>plikacji </a:t>
+            </a:r>
             <a:r>
               <a:rPr lang="pl-PL" dirty="0"/>
-              <a:t>Zrównoleglenie obliczeń: zgłoszone misje mogą być rozpatrywane niezależnie</a:t>
-            </a:r>
-          </a:p>
-          <a:p>
-            <a:r>
-              <a:rPr lang="pl-PL" dirty="0"/>
-              <a:t>Szeregowanie zadań: stacja kontrolna może wydajnie szeregować i przydzielać zlecone </a:t>
-            </a:r>
-            <a:r>
-              <a:rPr lang="pl-PL" dirty="0" smtClean="0"/>
-              <a:t>misje</a:t>
+              <a:t>W</a:t>
+            </a:r>
+            <a:r>
+              <a:rPr lang="pl-PL" dirty="0" smtClean="0"/>
+              <a:t>ebowej </a:t>
+            </a:r>
+            <a:r>
+              <a:rPr lang="pl-PL" dirty="0" smtClean="0"/>
+              <a:t>celem wyeliminowania sytuacji, w której </a:t>
+            </a:r>
+            <a:r>
+              <a:rPr lang="pl-PL" dirty="0" smtClean="0"/>
+              <a:t>Użytkownik </a:t>
+            </a:r>
+            <a:r>
+              <a:rPr lang="pl-PL" dirty="0" smtClean="0"/>
+              <a:t>nie może zgłosić misji</a:t>
+            </a:r>
+          </a:p>
+          <a:p>
+            <a:r>
+              <a:rPr lang="pl-PL" dirty="0" smtClean="0"/>
+              <a:t>Codzienne kopie zapasowe wszystkich baz danych przechowywane przez miesiąc czasu</a:t>
+            </a:r>
+          </a:p>
+          <a:p>
+            <a:r>
+              <a:rPr lang="pl-PL" dirty="0" smtClean="0"/>
+              <a:t>Redundancja danych w modułach </a:t>
+            </a:r>
+            <a:r>
+              <a:rPr lang="pl-PL" dirty="0" smtClean="0"/>
+              <a:t>Operatora </a:t>
+            </a:r>
+            <a:r>
+              <a:rPr lang="pl-PL" dirty="0" smtClean="0"/>
+              <a:t>i </a:t>
+            </a:r>
+            <a:r>
+              <a:rPr lang="pl-PL" dirty="0" smtClean="0"/>
+              <a:t>Stacji Kontroli </a:t>
+            </a:r>
+            <a:r>
+              <a:rPr lang="pl-PL" dirty="0" smtClean="0"/>
+              <a:t>– przykładowo wykorzystanie macierzy RAID</a:t>
+            </a:r>
+          </a:p>
+          <a:p>
+            <a:r>
+              <a:rPr lang="pl-PL" dirty="0" smtClean="0"/>
+              <a:t>Zapobieganie awariom: jeśli podniesiony zostanie alarm dla </a:t>
+            </a:r>
+            <a:r>
+              <a:rPr lang="pl-PL" dirty="0" smtClean="0"/>
+              <a:t>Samolotu</a:t>
+            </a:r>
+            <a:r>
+              <a:rPr lang="pl-PL" dirty="0" smtClean="0"/>
+              <a:t>, </a:t>
+            </a:r>
+            <a:r>
+              <a:rPr lang="pl-PL" dirty="0" smtClean="0"/>
+              <a:t>Samolot </a:t>
+            </a:r>
+            <a:r>
+              <a:rPr lang="pl-PL" dirty="0" smtClean="0"/>
+              <a:t>ten przestaje być dostępny dla </a:t>
+            </a:r>
+            <a:r>
+              <a:rPr lang="pl-PL" dirty="0" smtClean="0"/>
+              <a:t>Użytkowników </a:t>
+            </a:r>
+            <a:r>
+              <a:rPr lang="pl-PL" dirty="0" smtClean="0"/>
+              <a:t>(removal from service)</a:t>
             </a:r>
             <a:endParaRPr lang="pl-PL" dirty="0"/>
+          </a:p>
+          <a:p>
+            <a:endParaRPr lang="pl-PL" dirty="0" smtClean="0"/>
           </a:p>
         </p:txBody>
       </p:sp>
@@ -4518,7 +4706,7 @@
     </p:spTree>
     <p:extLst>
       <p:ext uri="{BB962C8B-B14F-4D97-AF65-F5344CB8AC3E}">
-        <p14:creationId xmlns:p14="http://schemas.microsoft.com/office/powerpoint/2010/main" val="2148444960"/>
+        <p14:creationId xmlns:p14="http://schemas.microsoft.com/office/powerpoint/2010/main" val="377667798"/>
       </p:ext>
     </p:extLst>
   </p:cSld>
@@ -4562,6 +4750,141 @@
           <a:p>
             <a:r>
               <a:rPr lang="pl-PL" dirty="0" smtClean="0"/>
+              <a:t>Taktyki wydajności</a:t>
+            </a:r>
+            <a:endParaRPr lang="pl-PL" dirty="0"/>
+          </a:p>
+        </p:txBody>
+      </p:sp>
+      <p:sp>
+        <p:nvSpPr>
+          <p:cNvPr id="3" name="Content Placeholder 2"/>
+          <p:cNvSpPr>
+            <a:spLocks noGrp="1"/>
+          </p:cNvSpPr>
+          <p:nvPr>
+            <p:ph idx="1"/>
+          </p:nvPr>
+        </p:nvSpPr>
+        <p:spPr/>
+        <p:txBody>
+          <a:bodyPr/>
+          <a:lstStyle/>
+          <a:p>
+            <a:r>
+              <a:rPr lang="pl-PL" dirty="0" smtClean="0"/>
+              <a:t>Ograniczenie </a:t>
+            </a:r>
+            <a:r>
+              <a:rPr lang="pl-PL" dirty="0"/>
+              <a:t>narzutów: </a:t>
+            </a:r>
+            <a:r>
+              <a:rPr lang="pl-PL" dirty="0" smtClean="0"/>
+              <a:t>Samolot </a:t>
+            </a:r>
+            <a:r>
+              <a:rPr lang="pl-PL" dirty="0"/>
+              <a:t>komunikuje się jedynie ze </a:t>
+            </a:r>
+            <a:r>
+              <a:rPr lang="pl-PL" dirty="0" smtClean="0"/>
+              <a:t>Stacją Kontroli, </a:t>
+            </a:r>
+            <a:r>
+              <a:rPr lang="pl-PL" dirty="0"/>
+              <a:t>co pozwala osiągnąć wydajne sterowanie jego lotem</a:t>
+            </a:r>
+          </a:p>
+          <a:p>
+            <a:r>
+              <a:rPr lang="pl-PL" dirty="0"/>
+              <a:t>Zrównoleglenie obliczeń: zgłoszone misje mogą być rozpatrywane niezależnie</a:t>
+            </a:r>
+          </a:p>
+          <a:p>
+            <a:r>
+              <a:rPr lang="pl-PL" dirty="0"/>
+              <a:t>Szeregowanie zadań: stacja kontrolna może wydajnie szeregować i przydzielać zlecone </a:t>
+            </a:r>
+            <a:r>
+              <a:rPr lang="pl-PL" dirty="0" smtClean="0"/>
+              <a:t>misje</a:t>
+            </a:r>
+            <a:endParaRPr lang="pl-PL" dirty="0"/>
+          </a:p>
+        </p:txBody>
+      </p:sp>
+      <p:sp>
+        <p:nvSpPr>
+          <p:cNvPr id="4" name="Slide Number Placeholder 3"/>
+          <p:cNvSpPr>
+            <a:spLocks noGrp="1"/>
+          </p:cNvSpPr>
+          <p:nvPr>
+            <p:ph type="sldNum" sz="quarter" idx="12"/>
+          </p:nvPr>
+        </p:nvSpPr>
+        <p:spPr/>
+        <p:txBody>
+          <a:bodyPr/>
+          <a:lstStyle/>
+          <a:p>
+            <a:fld id="{1F7F3A02-1D12-4D1D-B3D0-BE69B2FD8F86}" type="slidenum">
+              <a:rPr lang="pl-PL" smtClean="0"/>
+              <a:t>16</a:t>
+            </a:fld>
+            <a:endParaRPr lang="pl-PL"/>
+          </a:p>
+        </p:txBody>
+      </p:sp>
+    </p:spTree>
+    <p:extLst>
+      <p:ext uri="{BB962C8B-B14F-4D97-AF65-F5344CB8AC3E}">
+        <p14:creationId xmlns:p14="http://schemas.microsoft.com/office/powerpoint/2010/main" val="2148444960"/>
+      </p:ext>
+    </p:extLst>
+  </p:cSld>
+  <p:clrMapOvr>
+    <a:masterClrMapping/>
+  </p:clrMapOvr>
+</p:sld>
+</file>
+
+<file path=ppt/slides/slide17.xml><?xml version="1.0" encoding="utf-8"?>
+<p:sld xmlns:a="http://schemas.openxmlformats.org/drawingml/2006/main" xmlns:r="http://schemas.openxmlformats.org/officeDocument/2006/relationships" xmlns:p="http://schemas.openxmlformats.org/presentationml/2006/main">
+  <p:cSld>
+    <p:spTree>
+      <p:nvGrpSpPr>
+        <p:cNvPr id="1" name=""/>
+        <p:cNvGrpSpPr/>
+        <p:nvPr/>
+      </p:nvGrpSpPr>
+      <p:grpSpPr>
+        <a:xfrm>
+          <a:off x="0" y="0"/>
+          <a:ext cx="0" cy="0"/>
+          <a:chOff x="0" y="0"/>
+          <a:chExt cx="0" cy="0"/>
+        </a:xfrm>
+      </p:grpSpPr>
+      <p:sp>
+        <p:nvSpPr>
+          <p:cNvPr id="2" name="Title 1"/>
+          <p:cNvSpPr>
+            <a:spLocks noGrp="1"/>
+          </p:cNvSpPr>
+          <p:nvPr>
+            <p:ph type="title"/>
+          </p:nvPr>
+        </p:nvSpPr>
+        <p:spPr/>
+        <p:txBody>
+          <a:bodyPr/>
+          <a:lstStyle/>
+          <a:p>
+            <a:r>
+              <a:rPr lang="pl-PL" dirty="0" smtClean="0"/>
               <a:t>Inne taktyki</a:t>
             </a:r>
             <a:endParaRPr lang="pl-PL" dirty="0"/>
@@ -4599,8 +4922,29 @@
             <a:pPr lvl="1"/>
             <a:r>
               <a:rPr lang="pl-PL" dirty="0" smtClean="0"/>
-              <a:t>Service discovery - samoloty samodzielnie zgłaszają się do stacji kontroli</a:t>
-            </a:r>
+              <a:t>Service discovery - </a:t>
+            </a:r>
+            <a:r>
+              <a:rPr lang="pl-PL" dirty="0" smtClean="0"/>
+              <a:t>Samoloty </a:t>
+            </a:r>
+            <a:r>
+              <a:rPr lang="pl-PL" dirty="0" smtClean="0"/>
+              <a:t>samodzielnie zgłaszają się do </a:t>
+            </a:r>
+            <a:r>
+              <a:rPr lang="pl-PL" dirty="0" smtClean="0"/>
+              <a:t>Stacji </a:t>
+            </a:r>
+            <a:r>
+              <a:rPr lang="pl-PL" dirty="0"/>
+              <a:t>K</a:t>
+            </a:r>
+            <a:r>
+              <a:rPr lang="pl-PL" dirty="0" smtClean="0"/>
+              <a:t>ontroli</a:t>
+            </a:r>
+            <a:endParaRPr lang="pl-PL" dirty="0" smtClean="0"/>
           </a:p>
           <a:p>
             <a:r>
@@ -4618,20 +4962,45 @@
           <a:p>
             <a:pPr lvl="2"/>
             <a:r>
-              <a:rPr lang="pl-PL" dirty="0" smtClean="0"/>
-              <a:t>serwer stacji nie musi wiedzieć ilu jest klientów systemu</a:t>
+              <a:rPr lang="pl-PL" dirty="0"/>
+              <a:t>S</a:t>
+            </a:r>
+            <a:r>
+              <a:rPr lang="pl-PL" dirty="0" smtClean="0"/>
+              <a:t>erwer </a:t>
+            </a:r>
+            <a:r>
+              <a:rPr lang="pl-PL" dirty="0" smtClean="0"/>
+              <a:t>S</a:t>
+            </a:r>
+            <a:r>
+              <a:rPr lang="pl-PL" dirty="0" smtClean="0"/>
+              <a:t>tacji Kontroli </a:t>
+            </a:r>
+            <a:r>
+              <a:rPr lang="pl-PL" dirty="0" smtClean="0"/>
+              <a:t>nie musi wiedzieć ilu jest klientów systemu</a:t>
             </a:r>
           </a:p>
           <a:p>
             <a:pPr lvl="2"/>
             <a:r>
               <a:rPr lang="pl-PL" dirty="0"/>
-              <a:t>s</a:t>
-            </a:r>
-            <a:r>
-              <a:rPr lang="pl-PL" dirty="0" smtClean="0"/>
-              <a:t>amolot nie musi wiedzieć o istnieniu klientów i serwera centralnego</a:t>
-            </a:r>
+              <a:t>S</a:t>
+            </a:r>
+            <a:r>
+              <a:rPr lang="pl-PL" dirty="0" smtClean="0"/>
+              <a:t>amolot </a:t>
+            </a:r>
+            <a:r>
+              <a:rPr lang="pl-PL" dirty="0" smtClean="0"/>
+              <a:t>nie musi wiedzieć o istnieniu </a:t>
+            </a:r>
+            <a:r>
+              <a:rPr lang="pl-PL" dirty="0" smtClean="0"/>
+              <a:t>Użytkowników i Serwera Centralnego</a:t>
+            </a:r>
+            <a:endParaRPr lang="pl-PL" dirty="0" smtClean="0"/>
           </a:p>
           <a:p>
             <a:pPr lvl="1"/>
@@ -4644,12 +5013,37 @@
             <a:pPr lvl="2"/>
             <a:r>
               <a:rPr lang="pl-PL" dirty="0"/>
-              <a:t>w</a:t>
-            </a:r>
-            <a:r>
-              <a:rPr lang="pl-PL" dirty="0" smtClean="0"/>
-              <a:t>szelka komunikacja z samolotem następuje za pośrednictwem stacji kontrolnej</a:t>
-            </a:r>
+              <a:t>W</a:t>
+            </a:r>
+            <a:r>
+              <a:rPr lang="pl-PL" dirty="0" smtClean="0"/>
+              <a:t>szelka </a:t>
+            </a:r>
+            <a:r>
+              <a:rPr lang="pl-PL" dirty="0" smtClean="0"/>
+              <a:t>komunikacja </a:t>
+            </a:r>
+            <a:r>
+              <a:rPr lang="pl-PL" dirty="0" smtClean="0"/>
+              <a:t>z Samolotem </a:t>
+            </a:r>
+            <a:r>
+              <a:rPr lang="pl-PL" dirty="0" smtClean="0"/>
+              <a:t>następuje za </a:t>
+            </a:r>
+            <a:r>
+              <a:rPr lang="pl-PL" dirty="0" smtClean="0"/>
+              <a:t>pośrednictwem Stacji </a:t>
+            </a:r>
+            <a:r>
+              <a:rPr lang="pl-PL" dirty="0" smtClean="0"/>
+              <a:t>K</a:t>
+            </a:r>
+            <a:r>
+              <a:rPr lang="pl-PL" dirty="0" smtClean="0"/>
+              <a:t>ontroli</a:t>
+            </a:r>
+            <a:endParaRPr lang="pl-PL" dirty="0" smtClean="0"/>
           </a:p>
         </p:txBody>
       </p:sp>
@@ -4670,7 +5064,7 @@
           <a:p>
             <a:fld id="{1F7F3A02-1D12-4D1D-B3D0-BE69B2FD8F86}" type="slidenum">
               <a:rPr lang="pl-PL" smtClean="0"/>
-              <a:t>16</a:t>
+              <a:t>17</a:t>
             </a:fld>
             <a:endParaRPr lang="pl-PL"/>
           </a:p>
@@ -4696,7 +5090,7 @@
 </p:sld>
 </file>
 
-<file path=ppt/slides/slide17.xml><?xml version="1.0" encoding="utf-8"?>
+<file path=ppt/slides/slide18.xml><?xml version="1.0" encoding="utf-8"?>
 <p:sld xmlns:a="http://schemas.openxmlformats.org/drawingml/2006/main" xmlns:r="http://schemas.openxmlformats.org/officeDocument/2006/relationships" xmlns:p="http://schemas.openxmlformats.org/presentationml/2006/main">
   <p:cSld>
     <p:spTree>
@@ -4753,7 +5147,7 @@
           <a:p>
             <a:fld id="{1F7F3A02-1D12-4D1D-B3D0-BE69B2FD8F86}" type="slidenum">
               <a:rPr lang="pl-PL" smtClean="0"/>
-              <a:t>17</a:t>
+              <a:t>18</a:t>
             </a:fld>
             <a:endParaRPr lang="pl-PL"/>
           </a:p>
@@ -4884,6 +5278,19 @@
           <a:p>
             <a:r>
               <a:rPr lang="pl-PL" dirty="0" smtClean="0"/>
+              <a:t>Wymagania</a:t>
+            </a:r>
+          </a:p>
+          <a:p>
+            <a:r>
+              <a:rPr lang="pl-PL" dirty="0" smtClean="0"/>
+              <a:t>Skala systemu</a:t>
+            </a:r>
+            <a:endParaRPr lang="pl-PL" dirty="0" smtClean="0"/>
+          </a:p>
+          <a:p>
+            <a:r>
+              <a:rPr lang="pl-PL" dirty="0" smtClean="0"/>
               <a:t>Model 4+1 Views</a:t>
             </a:r>
           </a:p>
@@ -5108,14 +5515,31 @@
           <a:p>
             <a:r>
               <a:rPr lang="pl-PL" dirty="0" smtClean="0"/>
-              <a:t>Firma Google zleciła Instytutowi Lotnictwa dostarczenie samolotu PHOENIX wraz z naziemną stacją kontroli</a:t>
-            </a:r>
+              <a:t>Firma Google zleciła Instytutowi Lotnictwa dostarczenie </a:t>
+            </a:r>
+            <a:r>
+              <a:rPr lang="pl-PL" dirty="0" smtClean="0"/>
+              <a:t>Samolotu </a:t>
+            </a:r>
+            <a:r>
+              <a:rPr lang="pl-PL" dirty="0" smtClean="0"/>
+              <a:t>PHOENIX wraz z naziemną </a:t>
+            </a:r>
+            <a:r>
+              <a:rPr lang="pl-PL" dirty="0" smtClean="0"/>
+              <a:t>Stacją Kontroli</a:t>
+            </a:r>
+            <a:endParaRPr lang="pl-PL" dirty="0" smtClean="0"/>
           </a:p>
           <a:p>
             <a:pPr lvl="1"/>
             <a:r>
               <a:rPr lang="pl-PL" dirty="0" smtClean="0"/>
-              <a:t>Celem firmy Google jest wynajmowanie samolotu </a:t>
+              <a:t>Celem firmy Google jest wynajmowanie </a:t>
+            </a:r>
+            <a:r>
+              <a:rPr lang="pl-PL" dirty="0" smtClean="0"/>
+              <a:t>Samolotu </a:t>
             </a:r>
             <a:r>
               <a:rPr lang="pl-PL" dirty="0"/>
@@ -5130,25 +5554,63 @@
             <a:pPr lvl="1"/>
             <a:r>
               <a:rPr lang="pl-PL" dirty="0" smtClean="0"/>
-              <a:t>Instytut Lotnictwa nie posiada obecnie naziemnej stacji kontroli</a:t>
-            </a:r>
-          </a:p>
-          <a:p>
-            <a:r>
-              <a:rPr lang="pl-PL" dirty="0" smtClean="0"/>
-              <a:t>Instytut Lotnictwa zlecił zespołowi zaprojektowanie architektury rzeczonej stacji</a:t>
-            </a:r>
-          </a:p>
-          <a:p>
-            <a:r>
-              <a:rPr lang="pl-PL" dirty="0" smtClean="0"/>
-              <a:t>Implementacją systemu, na zlecenie Instytutu, zajmie się firma Pegasus Avionicus</a:t>
-            </a:r>
-          </a:p>
-          <a:p>
-            <a:r>
-              <a:rPr lang="pl-PL" dirty="0" smtClean="0"/>
-              <a:t>Ze względu na złożoność technologii, wszelkie zgłoszenia podmiotów zewnętrznych rozpatruje i zatwierdza (bądź  odrzuca) operator wyznaczony przez firmę Google</a:t>
+              <a:t>Instytut Lotnictwa nie posiada obecnie naziemnej </a:t>
+            </a:r>
+            <a:r>
+              <a:rPr lang="pl-PL" dirty="0" smtClean="0"/>
+              <a:t>Stacji </a:t>
+            </a:r>
+            <a:r>
+              <a:rPr lang="pl-PL" dirty="0"/>
+              <a:t>K</a:t>
+            </a:r>
+            <a:r>
+              <a:rPr lang="pl-PL" dirty="0" smtClean="0"/>
+              <a:t>ontroli</a:t>
+            </a:r>
+            <a:endParaRPr lang="pl-PL" dirty="0" smtClean="0"/>
+          </a:p>
+          <a:p>
+            <a:r>
+              <a:rPr lang="pl-PL" dirty="0" smtClean="0"/>
+              <a:t>Instytut Lotnictwa zlecił zespołowi zaprojektowanie </a:t>
+            </a:r>
+            <a:r>
+              <a:rPr lang="pl-PL" dirty="0" smtClean="0"/>
+              <a:t>architektury Stacji Kontroli</a:t>
+            </a:r>
+            <a:endParaRPr lang="pl-PL" dirty="0" smtClean="0"/>
+          </a:p>
+          <a:p>
+            <a:r>
+              <a:rPr lang="pl-PL" dirty="0" smtClean="0"/>
+              <a:t>Implementacją, </a:t>
+            </a:r>
+            <a:r>
+              <a:rPr lang="pl-PL" dirty="0" smtClean="0"/>
+              <a:t>na zlecenie Instytutu, zajmie się firma Pegasus Avionicus</a:t>
+            </a:r>
+          </a:p>
+          <a:p>
+            <a:r>
+              <a:rPr lang="pl-PL" dirty="0" smtClean="0"/>
+              <a:t>Ze względu na złożoność technologii, wszelkie zgłoszenia podmiotów </a:t>
+            </a:r>
+            <a:r>
+              <a:rPr lang="pl-PL" dirty="0" smtClean="0"/>
+              <a:t>zewnętrznych (Użytkowników) </a:t>
+            </a:r>
+            <a:r>
+              <a:rPr lang="pl-PL" dirty="0" smtClean="0"/>
+              <a:t>rozpatruje i zatwierdza (bądź  odrzuca) </a:t>
+            </a:r>
+            <a:r>
+              <a:rPr lang="pl-PL" dirty="0" smtClean="0"/>
+              <a:t>Operator </a:t>
+            </a:r>
+            <a:r>
+              <a:rPr lang="pl-PL" dirty="0" smtClean="0"/>
+              <a:t>wyznaczony przez firmę Google</a:t>
             </a:r>
             <a:endParaRPr lang="pl-PL" dirty="0"/>
           </a:p>
@@ -5224,7 +5686,7 @@
           <a:p>
             <a:r>
               <a:rPr lang="pl-PL" dirty="0" smtClean="0"/>
-              <a:t>Wymagania</a:t>
+              <a:t>Interesariusze</a:t>
             </a:r>
             <a:endParaRPr lang="pl-PL" dirty="0"/>
           </a:p>
@@ -5247,23 +5709,62 @@
           <a:p>
             <a:r>
               <a:rPr lang="pl-PL" dirty="0" smtClean="0"/>
-              <a:t>Pojedyncza stacja obsługuje wiele samolotów</a:t>
-            </a:r>
-          </a:p>
-          <a:p>
-            <a:r>
-              <a:rPr lang="pl-PL" dirty="0" smtClean="0"/>
-              <a:t>Aplikacja kliencka wspiera wszystkie popularne systemy operacyjne (Windows, OS X, Ubuntu, Android, iOS, Windows Phone)</a:t>
-            </a:r>
-          </a:p>
-          <a:p>
-            <a:r>
-              <a:rPr lang="pl-PL" dirty="0" smtClean="0"/>
-              <a:t>Aplikacja kliencka jest dostępna dla użytkowników przez cały czas</a:t>
-            </a:r>
-          </a:p>
-          <a:p>
-            <a:endParaRPr lang="pl-PL" dirty="0" smtClean="0"/>
+              <a:t>Klient: Instytut Lotnictwa</a:t>
+            </a:r>
+          </a:p>
+          <a:p>
+            <a:r>
+              <a:rPr lang="pl-PL" dirty="0" smtClean="0"/>
+              <a:t>Użytkownik: podmioty zewnętrzene (klienci firmy Google)</a:t>
+            </a:r>
+          </a:p>
+          <a:p>
+            <a:r>
+              <a:rPr lang="pl-PL" dirty="0" smtClean="0"/>
+              <a:t>Właściciel: firma Google</a:t>
+            </a:r>
+          </a:p>
+          <a:p>
+            <a:r>
+              <a:rPr lang="pl-PL" dirty="0" smtClean="0"/>
+              <a:t>Operator: podmiot rozpatrujący zgłoszenia Klientów</a:t>
+            </a:r>
+          </a:p>
+          <a:p>
+            <a:r>
+              <a:rPr lang="pl-PL" dirty="0" smtClean="0"/>
+              <a:t>Architekt: Zespół</a:t>
+            </a:r>
+          </a:p>
+          <a:p>
+            <a:r>
+              <a:rPr lang="pl-PL" dirty="0" smtClean="0"/>
+              <a:t>Deweloper: </a:t>
+            </a:r>
+            <a:r>
+              <a:rPr lang="pl-PL" dirty="0"/>
+              <a:t>Pegasus Avionicus</a:t>
+            </a:r>
+          </a:p>
+          <a:p>
+            <a:r>
+              <a:rPr lang="pl-PL" dirty="0" smtClean="0"/>
+              <a:t>Dostawca kompletnego systemu: </a:t>
+            </a:r>
+            <a:r>
+              <a:rPr lang="pl-PL" dirty="0"/>
+              <a:t>Instytut </a:t>
+            </a:r>
+            <a:r>
+              <a:rPr lang="pl-PL" dirty="0" smtClean="0"/>
+              <a:t>Lotnictwa</a:t>
+            </a:r>
+          </a:p>
+          <a:p>
+            <a:r>
+              <a:rPr lang="pl-PL" dirty="0" smtClean="0"/>
+              <a:t>Administrator: firma Google</a:t>
+            </a:r>
           </a:p>
           <a:p>
             <a:endParaRPr lang="pl-PL" dirty="0"/>
@@ -5296,7 +5797,7 @@
     </p:spTree>
     <p:extLst>
       <p:ext uri="{BB962C8B-B14F-4D97-AF65-F5344CB8AC3E}">
-        <p14:creationId xmlns:p14="http://schemas.microsoft.com/office/powerpoint/2010/main" val="3062258622"/>
+        <p14:creationId xmlns:p14="http://schemas.microsoft.com/office/powerpoint/2010/main" val="1532331192"/>
       </p:ext>
     </p:extLst>
   </p:cSld>
@@ -5340,7 +5841,7 @@
           <a:p>
             <a:r>
               <a:rPr lang="pl-PL" dirty="0" smtClean="0"/>
-              <a:t>Interesariusze</a:t>
+              <a:t>Wymagania</a:t>
             </a:r>
             <a:endParaRPr lang="pl-PL" dirty="0"/>
           </a:p>
@@ -5363,62 +5864,72 @@
           <a:p>
             <a:r>
               <a:rPr lang="pl-PL" dirty="0" smtClean="0"/>
-              <a:t>Klient: Instytut Lotnictwa</a:t>
-            </a:r>
-          </a:p>
-          <a:p>
-            <a:r>
-              <a:rPr lang="pl-PL" dirty="0" smtClean="0"/>
-              <a:t>Użytkownik: podmioty zewnętrzene (klienci firmy Google)</a:t>
-            </a:r>
-          </a:p>
-          <a:p>
-            <a:r>
-              <a:rPr lang="pl-PL" dirty="0" smtClean="0"/>
-              <a:t>Właściciel: firma Google</a:t>
-            </a:r>
-          </a:p>
-          <a:p>
-            <a:r>
-              <a:rPr lang="pl-PL" dirty="0" smtClean="0"/>
-              <a:t>Operator: podmiot rozpatrujący zgłoszenia Klientów</a:t>
-            </a:r>
-          </a:p>
-          <a:p>
-            <a:r>
-              <a:rPr lang="pl-PL" dirty="0" smtClean="0"/>
-              <a:t>Architekt: Zespół</a:t>
-            </a:r>
-          </a:p>
-          <a:p>
-            <a:r>
-              <a:rPr lang="pl-PL" dirty="0" smtClean="0"/>
-              <a:t>Deweloper: </a:t>
+              <a:t>Pojedyncza </a:t>
+            </a:r>
+            <a:r>
+              <a:rPr lang="pl-PL" dirty="0" smtClean="0"/>
+              <a:t>S</a:t>
+            </a:r>
+            <a:r>
+              <a:rPr lang="pl-PL" dirty="0" smtClean="0"/>
+              <a:t>tacja Kontroli </a:t>
+            </a:r>
+            <a:r>
+              <a:rPr lang="pl-PL" dirty="0" smtClean="0"/>
+              <a:t>obsługuje wiele </a:t>
+            </a:r>
+            <a:r>
+              <a:rPr lang="pl-PL" dirty="0" smtClean="0"/>
+              <a:t>Samolotów</a:t>
+            </a:r>
+            <a:endParaRPr lang="pl-PL" dirty="0" smtClean="0"/>
+          </a:p>
+          <a:p>
+            <a:r>
+              <a:rPr lang="pl-PL" dirty="0" smtClean="0"/>
+              <a:t>Aplikacja </a:t>
             </a:r>
             <a:r>
               <a:rPr lang="pl-PL" dirty="0"/>
-              <a:t>Pegasus Avionicus</a:t>
-            </a:r>
-          </a:p>
-          <a:p>
-            <a:r>
-              <a:rPr lang="pl-PL" dirty="0" smtClean="0"/>
-              <a:t>Dostawca kompletnego systemu: </a:t>
+              <a:t>kliencka (Aplikacja </a:t>
+            </a:r>
+            <a:r>
+              <a:rPr lang="pl-PL" dirty="0" smtClean="0"/>
+              <a:t>Webowa</a:t>
             </a:r>
             <a:r>
               <a:rPr lang="pl-PL" dirty="0"/>
-              <a:t>Instytut </a:t>
-            </a:r>
-            <a:r>
-              <a:rPr lang="pl-PL" dirty="0" smtClean="0"/>
-              <a:t>Lotnictwa</a:t>
-            </a:r>
-          </a:p>
-          <a:p>
-            <a:r>
-              <a:rPr lang="pl-PL" dirty="0" smtClean="0"/>
-              <a:t>Administrator: firma Google</a:t>
-            </a:r>
+              <a:t>) </a:t>
+            </a:r>
+            <a:r>
+              <a:rPr lang="pl-PL" dirty="0" smtClean="0"/>
+              <a:t>wspiera wszystkie popularne systemy operacyjne (Windows, OS X, Ubuntu, Android, iOS, Windows Phone)</a:t>
+            </a:r>
+          </a:p>
+          <a:p>
+            <a:r>
+              <a:rPr lang="pl-PL" dirty="0" smtClean="0"/>
+              <a:t>Aplikacja </a:t>
+            </a:r>
+            <a:r>
+              <a:rPr lang="pl-PL" dirty="0" smtClean="0"/>
+              <a:t>Webowa jest </a:t>
+            </a:r>
+            <a:r>
+              <a:rPr lang="pl-PL" dirty="0" smtClean="0"/>
+              <a:t>dostępna dla </a:t>
+            </a:r>
+            <a:r>
+              <a:rPr lang="pl-PL" dirty="0" smtClean="0"/>
+              <a:t>Użytkowników </a:t>
+            </a:r>
+            <a:r>
+              <a:rPr lang="pl-PL" dirty="0" smtClean="0"/>
+              <a:t>przez cały czas</a:t>
+            </a:r>
+          </a:p>
+          <a:p>
+            <a:endParaRPr lang="pl-PL" dirty="0" smtClean="0"/>
           </a:p>
           <a:p>
             <a:endParaRPr lang="pl-PL" dirty="0"/>
@@ -5451,7 +5962,7 @@
     </p:spTree>
     <p:extLst>
       <p:ext uri="{BB962C8B-B14F-4D97-AF65-F5344CB8AC3E}">
-        <p14:creationId xmlns:p14="http://schemas.microsoft.com/office/powerpoint/2010/main" val="1532331192"/>
+        <p14:creationId xmlns:p14="http://schemas.microsoft.com/office/powerpoint/2010/main" val="3062258622"/>
       </p:ext>
     </p:extLst>
   </p:cSld>
@@ -5494,13 +6005,98 @@
           <a:lstStyle/>
           <a:p>
             <a:r>
+              <a:rPr lang="pl-PL" dirty="0" smtClean="0"/>
+              <a:t>Skala systemu</a:t>
+            </a:r>
+            <a:endParaRPr lang="pl-PL" dirty="0"/>
+          </a:p>
+        </p:txBody>
+      </p:sp>
+      <p:sp>
+        <p:nvSpPr>
+          <p:cNvPr id="3" name="Content Placeholder 2"/>
+          <p:cNvSpPr>
+            <a:spLocks noGrp="1"/>
+          </p:cNvSpPr>
+          <p:nvPr>
+            <p:ph idx="1"/>
+          </p:nvPr>
+        </p:nvSpPr>
+        <p:spPr/>
+        <p:txBody>
+          <a:bodyPr>
+            <a:normAutofit/>
+          </a:bodyPr>
+          <a:lstStyle/>
+          <a:p>
+            <a:r>
               <a:rPr lang="pl-PL" dirty="0"/>
-              <a:t>4+1 </a:t>
-            </a:r>
-            <a:r>
-              <a:rPr lang="pl-PL" dirty="0" smtClean="0"/>
-              <a:t>Views: Scenarios</a:t>
-            </a:r>
+              <a:t>System </a:t>
+            </a:r>
+            <a:r>
+              <a:rPr lang="pl-PL" dirty="0" smtClean="0"/>
+              <a:t>jest </a:t>
+            </a:r>
+            <a:r>
+              <a:rPr lang="pl-PL" dirty="0"/>
+              <a:t>w stanie objąć co najmniej 10 Stacji Kontroli</a:t>
+            </a:r>
+          </a:p>
+          <a:p>
+            <a:r>
+              <a:rPr lang="pl-PL" dirty="0"/>
+              <a:t>Pojedyncza Stacja Kontroli </a:t>
+            </a:r>
+            <a:r>
+              <a:rPr lang="pl-PL" dirty="0" smtClean="0"/>
+              <a:t>jest </a:t>
+            </a:r>
+            <a:r>
+              <a:rPr lang="pl-PL" dirty="0"/>
+              <a:t>w stanie kontrolować co najmniej 10 </a:t>
+            </a:r>
+            <a:r>
+              <a:rPr lang="pl-PL" dirty="0" smtClean="0"/>
+              <a:t>Samolotów</a:t>
+            </a:r>
+          </a:p>
+          <a:p>
+            <a:r>
+              <a:rPr lang="pl-PL" dirty="0" smtClean="0"/>
+              <a:t>Komunikacja pomiędzy Stacją Kontroli a pojedynczym Samolotem może odbywać się z przepustowością co najmniej 2 Mb/s</a:t>
+            </a:r>
+          </a:p>
+          <a:p>
+            <a:r>
+              <a:rPr lang="pl-PL" dirty="0" smtClean="0"/>
+              <a:t>Maksymalne opóźnienie komunikacji pomiędzy Stacją Kontroli a pojedynczym Samolotem nie przekracza 1 s</a:t>
+            </a:r>
+            <a:endParaRPr lang="pl-PL" dirty="0"/>
+          </a:p>
+          <a:p>
+            <a:r>
+              <a:rPr lang="pl-PL" dirty="0" smtClean="0"/>
+              <a:t>Serwer Aplikacji </a:t>
+            </a:r>
+            <a:r>
+              <a:rPr lang="pl-PL" dirty="0"/>
+              <a:t>W</a:t>
+            </a:r>
+            <a:r>
+              <a:rPr lang="pl-PL" dirty="0" smtClean="0"/>
+              <a:t>ebowej jest w stanie </a:t>
+            </a:r>
+            <a:r>
+              <a:rPr lang="pl-PL" smtClean="0"/>
+              <a:t>obsłużyć 5 </a:t>
+            </a:r>
+            <a:r>
+              <a:rPr lang="pl-PL" dirty="0" smtClean="0"/>
+              <a:t>tys. Użytkowników jednocześnie</a:t>
+            </a:r>
+            <a:endParaRPr lang="pl-PL" dirty="0" smtClean="0"/>
+          </a:p>
+          <a:p>
             <a:endParaRPr lang="pl-PL" dirty="0"/>
           </a:p>
         </p:txBody>
@@ -5523,6 +6119,86 @@
             <a:fld id="{1F7F3A02-1D12-4D1D-B3D0-BE69B2FD8F86}" type="slidenum">
               <a:rPr lang="pl-PL" smtClean="0"/>
               <a:t>7</a:t>
+            </a:fld>
+            <a:endParaRPr lang="pl-PL"/>
+          </a:p>
+        </p:txBody>
+      </p:sp>
+    </p:spTree>
+    <p:extLst>
+      <p:ext uri="{BB962C8B-B14F-4D97-AF65-F5344CB8AC3E}">
+        <p14:creationId xmlns:p14="http://schemas.microsoft.com/office/powerpoint/2010/main" val="3572674044"/>
+      </p:ext>
+    </p:extLst>
+  </p:cSld>
+  <p:clrMapOvr>
+    <a:masterClrMapping/>
+  </p:clrMapOvr>
+</p:sld>
+</file>
+
+<file path=ppt/slides/slide8.xml><?xml version="1.0" encoding="utf-8"?>
+<p:sld xmlns:a="http://schemas.openxmlformats.org/drawingml/2006/main" xmlns:r="http://schemas.openxmlformats.org/officeDocument/2006/relationships" xmlns:p="http://schemas.openxmlformats.org/presentationml/2006/main">
+  <p:cSld>
+    <p:spTree>
+      <p:nvGrpSpPr>
+        <p:cNvPr id="1" name=""/>
+        <p:cNvGrpSpPr/>
+        <p:nvPr/>
+      </p:nvGrpSpPr>
+      <p:grpSpPr>
+        <a:xfrm>
+          <a:off x="0" y="0"/>
+          <a:ext cx="0" cy="0"/>
+          <a:chOff x="0" y="0"/>
+          <a:chExt cx="0" cy="0"/>
+        </a:xfrm>
+      </p:grpSpPr>
+      <p:sp>
+        <p:nvSpPr>
+          <p:cNvPr id="2" name="Title 1"/>
+          <p:cNvSpPr>
+            <a:spLocks noGrp="1"/>
+          </p:cNvSpPr>
+          <p:nvPr>
+            <p:ph type="title"/>
+          </p:nvPr>
+        </p:nvSpPr>
+        <p:spPr/>
+        <p:txBody>
+          <a:bodyPr/>
+          <a:lstStyle/>
+          <a:p>
+            <a:r>
+              <a:rPr lang="pl-PL" dirty="0"/>
+              <a:t>4+1 </a:t>
+            </a:r>
+            <a:r>
+              <a:rPr lang="pl-PL" dirty="0" smtClean="0"/>
+              <a:t>Views: Scenarios</a:t>
+            </a:r>
+            <a:endParaRPr lang="pl-PL" dirty="0"/>
+          </a:p>
+        </p:txBody>
+      </p:sp>
+      <p:sp>
+        <p:nvSpPr>
+          <p:cNvPr id="4" name="Slide Number Placeholder 3"/>
+          <p:cNvSpPr>
+            <a:spLocks noGrp="1"/>
+          </p:cNvSpPr>
+          <p:nvPr>
+            <p:ph type="sldNum" sz="quarter" idx="12"/>
+          </p:nvPr>
+        </p:nvSpPr>
+        <p:spPr/>
+        <p:txBody>
+          <a:bodyPr/>
+          <a:lstStyle/>
+          <a:p>
+            <a:fld id="{1F7F3A02-1D12-4D1D-B3D0-BE69B2FD8F86}" type="slidenum">
+              <a:rPr lang="pl-PL" smtClean="0"/>
+              <a:t>8</a:t>
             </a:fld>
             <a:endParaRPr lang="pl-PL"/>
           </a:p>
@@ -5571,7 +6247,7 @@
 </p:sld>
 </file>
 
-<file path=ppt/slides/slide8.xml><?xml version="1.0" encoding="utf-8"?>
+<file path=ppt/slides/slide9.xml><?xml version="1.0" encoding="utf-8"?>
 <p:sld xmlns:a="http://schemas.openxmlformats.org/drawingml/2006/main" xmlns:r="http://schemas.openxmlformats.org/officeDocument/2006/relationships" xmlns:p="http://schemas.openxmlformats.org/presentationml/2006/main">
   <p:cSld>
     <p:spTree>
@@ -5632,7 +6308,7 @@
           <a:p>
             <a:fld id="{1F7F3A02-1D12-4D1D-B3D0-BE69B2FD8F86}" type="slidenum">
               <a:rPr lang="pl-PL" smtClean="0"/>
-              <a:t>8</a:t>
+              <a:t>9</a:t>
             </a:fld>
             <a:endParaRPr lang="pl-PL"/>
           </a:p>
@@ -5685,118 +6361,6 @@
       </p:par>
     </p:tnLst>
   </p:timing>
-</p:sld>
-</file>
-
-<file path=ppt/slides/slide9.xml><?xml version="1.0" encoding="utf-8"?>
-<p:sld xmlns:a="http://schemas.openxmlformats.org/drawingml/2006/main" xmlns:r="http://schemas.openxmlformats.org/officeDocument/2006/relationships" xmlns:p="http://schemas.openxmlformats.org/presentationml/2006/main">
-  <p:cSld>
-    <p:spTree>
-      <p:nvGrpSpPr>
-        <p:cNvPr id="1" name=""/>
-        <p:cNvGrpSpPr/>
-        <p:nvPr/>
-      </p:nvGrpSpPr>
-      <p:grpSpPr>
-        <a:xfrm>
-          <a:off x="0" y="0"/>
-          <a:ext cx="0" cy="0"/>
-          <a:chOff x="0" y="0"/>
-          <a:chExt cx="0" cy="0"/>
-        </a:xfrm>
-      </p:grpSpPr>
-      <p:sp>
-        <p:nvSpPr>
-          <p:cNvPr id="2" name="Title 1"/>
-          <p:cNvSpPr>
-            <a:spLocks noGrp="1"/>
-          </p:cNvSpPr>
-          <p:nvPr>
-            <p:ph type="title"/>
-          </p:nvPr>
-        </p:nvSpPr>
-        <p:spPr/>
-        <p:txBody>
-          <a:bodyPr/>
-          <a:lstStyle/>
-          <a:p>
-            <a:r>
-              <a:rPr lang="pl-PL" dirty="0"/>
-              <a:t>4+1 Views: </a:t>
-            </a:r>
-            <a:r>
-              <a:rPr lang="pl-PL" dirty="0" smtClean="0"/>
-              <a:t>Development </a:t>
-            </a:r>
-            <a:r>
-              <a:rPr lang="pl-PL" dirty="0"/>
-              <a:t>View</a:t>
-            </a:r>
-          </a:p>
-        </p:txBody>
-      </p:sp>
-      <p:sp>
-        <p:nvSpPr>
-          <p:cNvPr id="4" name="Slide Number Placeholder 3"/>
-          <p:cNvSpPr>
-            <a:spLocks noGrp="1"/>
-          </p:cNvSpPr>
-          <p:nvPr>
-            <p:ph type="sldNum" sz="quarter" idx="12"/>
-          </p:nvPr>
-        </p:nvSpPr>
-        <p:spPr/>
-        <p:txBody>
-          <a:bodyPr/>
-          <a:lstStyle/>
-          <a:p>
-            <a:fld id="{1F7F3A02-1D12-4D1D-B3D0-BE69B2FD8F86}" type="slidenum">
-              <a:rPr lang="pl-PL" smtClean="0"/>
-              <a:t>9</a:t>
-            </a:fld>
-            <a:endParaRPr lang="pl-PL"/>
-          </a:p>
-        </p:txBody>
-      </p:sp>
-      <p:pic>
-        <p:nvPicPr>
-          <p:cNvPr id="5" name="Content Placeholder 4"/>
-          <p:cNvPicPr>
-            <a:picLocks noGrp="1" noChangeAspect="1"/>
-          </p:cNvPicPr>
-          <p:nvPr>
-            <p:ph idx="1"/>
-          </p:nvPr>
-        </p:nvPicPr>
-        <p:blipFill>
-          <a:blip r:embed="rId2">
-            <a:extLst>
-              <a:ext uri="{28A0092B-C50C-407E-A947-70E740481C1C}">
-                <a14:useLocalDpi xmlns:a14="http://schemas.microsoft.com/office/drawing/2010/main" val="0"/>
-              </a:ext>
-            </a:extLst>
-          </a:blip>
-          <a:stretch>
-            <a:fillRect/>
-          </a:stretch>
-        </p:blipFill>
-        <p:spPr>
-          <a:xfrm>
-            <a:off x="3629509" y="1556792"/>
-            <a:ext cx="1086507" cy="4622778"/>
-          </a:xfrm>
-        </p:spPr>
-      </p:pic>
-    </p:spTree>
-    <p:extLst>
-      <p:ext uri="{BB962C8B-B14F-4D97-AF65-F5344CB8AC3E}">
-        <p14:creationId xmlns:p14="http://schemas.microsoft.com/office/powerpoint/2010/main" val="2331594138"/>
-      </p:ext>
-    </p:extLst>
-  </p:cSld>
-  <p:clrMapOvr>
-    <a:masterClrMapping/>
-  </p:clrMapOvr>
 </p:sld>
 </file>
 

</xml_diff>